<commit_message>
updated the presentation with twitter data
</commit_message>
<xml_diff>
--- a/presentation.pptx
+++ b/presentation.pptx
@@ -13,10 +13,14 @@
     <p:sldId id="260" r:id="rId7"/>
     <p:sldId id="261" r:id="rId8"/>
     <p:sldId id="268" r:id="rId9"/>
-    <p:sldId id="269" r:id="rId10"/>
-    <p:sldId id="266" r:id="rId11"/>
-    <p:sldId id="264" r:id="rId12"/>
-    <p:sldId id="267" r:id="rId13"/>
+    <p:sldId id="270" r:id="rId10"/>
+    <p:sldId id="271" r:id="rId11"/>
+    <p:sldId id="269" r:id="rId12"/>
+    <p:sldId id="266" r:id="rId13"/>
+    <p:sldId id="264" r:id="rId14"/>
+    <p:sldId id="273" r:id="rId15"/>
+    <p:sldId id="267" r:id="rId16"/>
+    <p:sldId id="272" r:id="rId17"/>
   </p:sldIdLst>
   <p:sldSz cx="9144000" cy="6858000" type="screen4x3"/>
   <p:notesSz cx="6858000" cy="9144000"/>
@@ -298,11 +302,11 @@
         </c:dLbls>
         <c:gapWidth val="219"/>
         <c:overlap val="-27"/>
-        <c:axId val="1377738512"/>
-        <c:axId val="1377750480"/>
+        <c:axId val="1827042208"/>
+        <c:axId val="1827043840"/>
       </c:barChart>
       <c:catAx>
-        <c:axId val="1377738512"/>
+        <c:axId val="1827042208"/>
         <c:scaling>
           <c:orientation val="minMax"/>
         </c:scaling>
@@ -402,7 +406,7 @@
             <a:endParaRPr lang="en-US"/>
           </a:p>
         </c:txPr>
-        <c:crossAx val="1377750480"/>
+        <c:crossAx val="1827043840"/>
         <c:crosses val="autoZero"/>
         <c:auto val="1"/>
         <c:lblAlgn val="ctr"/>
@@ -410,7 +414,7 @@
         <c:noMultiLvlLbl val="0"/>
       </c:catAx>
       <c:valAx>
-        <c:axId val="1377750480"/>
+        <c:axId val="1827043840"/>
         <c:scaling>
           <c:orientation val="minMax"/>
         </c:scaling>
@@ -518,7 +522,7 @@
             <a:endParaRPr lang="en-US"/>
           </a:p>
         </c:txPr>
-        <c:crossAx val="1377738512"/>
+        <c:crossAx val="1827042208"/>
         <c:crosses val="autoZero"/>
         <c:crossBetween val="between"/>
       </c:valAx>
@@ -721,11 +725,11 @@
         </c:dLbls>
         <c:gapWidth val="219"/>
         <c:overlap val="-27"/>
-        <c:axId val="1377739056"/>
-        <c:axId val="1377748848"/>
+        <c:axId val="1900167728"/>
+        <c:axId val="1900166096"/>
       </c:barChart>
       <c:catAx>
-        <c:axId val="1377739056"/>
+        <c:axId val="1900167728"/>
         <c:scaling>
           <c:orientation val="minMax"/>
         </c:scaling>
@@ -825,7 +829,7 @@
             <a:endParaRPr lang="en-US"/>
           </a:p>
         </c:txPr>
-        <c:crossAx val="1377748848"/>
+        <c:crossAx val="1900166096"/>
         <c:crosses val="autoZero"/>
         <c:auto val="1"/>
         <c:lblAlgn val="ctr"/>
@@ -833,7 +837,7 @@
         <c:noMultiLvlLbl val="0"/>
       </c:catAx>
       <c:valAx>
-        <c:axId val="1377748848"/>
+        <c:axId val="1900166096"/>
         <c:scaling>
           <c:orientation val="minMax"/>
         </c:scaling>
@@ -941,7 +945,7 @@
             <a:endParaRPr lang="en-US"/>
           </a:p>
         </c:txPr>
-        <c:crossAx val="1377739056"/>
+        <c:crossAx val="1900167728"/>
         <c:crosses val="autoZero"/>
         <c:crossBetween val="between"/>
       </c:valAx>
@@ -981,6 +985,452 @@
 </file>
 
 <file path=ppt/charts/chart3.xml><?xml version="1.0" encoding="utf-8"?>
+<c:chartSpace xmlns:c="http://schemas.openxmlformats.org/drawingml/2006/chart" xmlns:a="http://schemas.openxmlformats.org/drawingml/2006/main" xmlns:r="http://schemas.openxmlformats.org/officeDocument/2006/relationships">
+  <c:date1904 val="0"/>
+  <c:lang val="en-US"/>
+  <c:roundedCorners val="0"/>
+  <mc:AlternateContent xmlns:mc="http://schemas.openxmlformats.org/markup-compatibility/2006">
+    <mc:Choice xmlns:c14="http://schemas.microsoft.com/office/drawing/2007/8/2/chart" Requires="c14">
+      <c14:style val="102"/>
+    </mc:Choice>
+    <mc:Fallback>
+      <c:style val="2"/>
+    </mc:Fallback>
+  </mc:AlternateContent>
+  <c:chart>
+    <c:title>
+      <c:tx>
+        <c:rich>
+          <a:bodyPr rot="0" spcFirstLastPara="1" vertOverflow="ellipsis" vert="horz" wrap="square" anchor="ctr" anchorCtr="1"/>
+          <a:lstStyle/>
+          <a:p>
+            <a:pPr marL="0" marR="0" indent="0" algn="ctr" defTabSz="914400" rtl="0" eaLnBrk="1" fontAlgn="auto" latinLnBrk="0" hangingPunct="1">
+              <a:lnSpc>
+                <a:spcPct val="100000"/>
+              </a:lnSpc>
+              <a:spcBef>
+                <a:spcPts val="0"/>
+              </a:spcBef>
+              <a:spcAft>
+                <a:spcPts val="0"/>
+              </a:spcAft>
+              <a:buClrTx/>
+              <a:buSzTx/>
+              <a:buFontTx/>
+              <a:buNone/>
+              <a:tabLst/>
+              <a:defRPr sz="1400" b="0" i="0" u="none" strike="noStrike" kern="1200" spc="0" baseline="0">
+                <a:solidFill>
+                  <a:srgbClr val="000000">
+                    <a:lumMod val="65000"/>
+                    <a:lumOff val="35000"/>
+                  </a:srgbClr>
+                </a:solidFill>
+                <a:latin typeface="+mn-lt"/>
+                <a:ea typeface="+mn-ea"/>
+                <a:cs typeface="+mn-cs"/>
+              </a:defRPr>
+            </a:pPr>
+            <a:r>
+              <a:rPr lang="en-US" sz="1800" b="0" i="0" baseline="0" dirty="0" smtClean="0">
+                <a:effectLst/>
+              </a:rPr>
+              <a:t>Evaluation with Filtered Influence (Twitter Only)</a:t>
+            </a:r>
+            <a:endParaRPr lang="en-US" dirty="0"/>
+          </a:p>
+        </c:rich>
+      </c:tx>
+      <c:layout/>
+      <c:overlay val="0"/>
+      <c:spPr>
+        <a:noFill/>
+        <a:ln>
+          <a:noFill/>
+        </a:ln>
+        <a:effectLst/>
+      </c:spPr>
+      <c:txPr>
+        <a:bodyPr rot="0" spcFirstLastPara="1" vertOverflow="ellipsis" vert="horz" wrap="square" anchor="ctr" anchorCtr="1"/>
+        <a:lstStyle/>
+        <a:p>
+          <a:pPr marL="0" marR="0" indent="0" algn="ctr" defTabSz="914400" rtl="0" eaLnBrk="1" fontAlgn="auto" latinLnBrk="0" hangingPunct="1">
+            <a:lnSpc>
+              <a:spcPct val="100000"/>
+            </a:lnSpc>
+            <a:spcBef>
+              <a:spcPts val="0"/>
+            </a:spcBef>
+            <a:spcAft>
+              <a:spcPts val="0"/>
+            </a:spcAft>
+            <a:buClrTx/>
+            <a:buSzTx/>
+            <a:buFontTx/>
+            <a:buNone/>
+            <a:tabLst/>
+            <a:defRPr sz="1400" b="0" i="0" u="none" strike="noStrike" kern="1200" spc="0" baseline="0">
+              <a:solidFill>
+                <a:srgbClr val="000000">
+                  <a:lumMod val="65000"/>
+                  <a:lumOff val="35000"/>
+                </a:srgbClr>
+              </a:solidFill>
+              <a:latin typeface="+mn-lt"/>
+              <a:ea typeface="+mn-ea"/>
+              <a:cs typeface="+mn-cs"/>
+            </a:defRPr>
+          </a:pPr>
+          <a:endParaRPr lang="en-US"/>
+        </a:p>
+      </c:txPr>
+    </c:title>
+    <c:autoTitleDeleted val="0"/>
+    <c:plotArea>
+      <c:layout/>
+      <c:barChart>
+        <c:barDir val="col"/>
+        <c:grouping val="clustered"/>
+        <c:varyColors val="0"/>
+        <c:ser>
+          <c:idx val="0"/>
+          <c:order val="0"/>
+          <c:tx>
+            <c:strRef>
+              <c:f>Sheet1!$B$1</c:f>
+              <c:strCache>
+                <c:ptCount val="1"/>
+                <c:pt idx="0">
+                  <c:v>Accuracy</c:v>
+                </c:pt>
+              </c:strCache>
+            </c:strRef>
+          </c:tx>
+          <c:spPr>
+            <a:solidFill>
+              <a:schemeClr val="accent1"/>
+            </a:solidFill>
+            <a:ln>
+              <a:noFill/>
+            </a:ln>
+            <a:effectLst/>
+          </c:spPr>
+          <c:invertIfNegative val="0"/>
+          <c:cat>
+            <c:strRef>
+              <c:f>Sheet1!$A$2:$A$5</c:f>
+              <c:strCache>
+                <c:ptCount val="4"/>
+                <c:pt idx="0">
+                  <c:v>kNN</c:v>
+                </c:pt>
+                <c:pt idx="1">
+                  <c:v>Random</c:v>
+                </c:pt>
+                <c:pt idx="2">
+                  <c:v>Sigmoid TanH SVM</c:v>
+                </c:pt>
+                <c:pt idx="3">
+                  <c:v>Linear SVM</c:v>
+                </c:pt>
+              </c:strCache>
+            </c:strRef>
+          </c:cat>
+          <c:val>
+            <c:numRef>
+              <c:f>Sheet1!$B$2:$B$5</c:f>
+              <c:numCache>
+                <c:formatCode>General</c:formatCode>
+                <c:ptCount val="4"/>
+                <c:pt idx="0">
+                  <c:v>0.42000000000000004</c:v>
+                </c:pt>
+                <c:pt idx="1">
+                  <c:v>0.5</c:v>
+                </c:pt>
+                <c:pt idx="2">
+                  <c:v>0.50285000000000002</c:v>
+                </c:pt>
+                <c:pt idx="3">
+                  <c:v>0.56887999999999994</c:v>
+                </c:pt>
+              </c:numCache>
+            </c:numRef>
+          </c:val>
+        </c:ser>
+        <c:dLbls>
+          <c:showLegendKey val="0"/>
+          <c:showVal val="0"/>
+          <c:showCatName val="0"/>
+          <c:showSerName val="0"/>
+          <c:showPercent val="0"/>
+          <c:showBubbleSize val="0"/>
+        </c:dLbls>
+        <c:gapWidth val="219"/>
+        <c:overlap val="-27"/>
+        <c:axId val="1900161200"/>
+        <c:axId val="1900159024"/>
+      </c:barChart>
+      <c:catAx>
+        <c:axId val="1900161200"/>
+        <c:scaling>
+          <c:orientation val="minMax"/>
+        </c:scaling>
+        <c:delete val="0"/>
+        <c:axPos val="b"/>
+        <c:title>
+          <c:tx>
+            <c:rich>
+              <a:bodyPr rot="0" spcFirstLastPara="1" vertOverflow="ellipsis" vert="horz" wrap="square" anchor="ctr" anchorCtr="1"/>
+              <a:lstStyle/>
+              <a:p>
+                <a:pPr>
+                  <a:defRPr sz="1000" b="0" i="0" u="none" strike="noStrike" kern="1200" baseline="0">
+                    <a:solidFill>
+                      <a:schemeClr val="tx1">
+                        <a:lumMod val="65000"/>
+                        <a:lumOff val="35000"/>
+                      </a:schemeClr>
+                    </a:solidFill>
+                    <a:latin typeface="+mn-lt"/>
+                    <a:ea typeface="+mn-ea"/>
+                    <a:cs typeface="+mn-cs"/>
+                  </a:defRPr>
+                </a:pPr>
+                <a:r>
+                  <a:rPr lang="en-US" dirty="0" smtClean="0"/>
+                  <a:t>Learning</a:t>
+                </a:r>
+                <a:r>
+                  <a:rPr lang="en-US" baseline="0" dirty="0" smtClean="0"/>
+                  <a:t> Algorithms</a:t>
+                </a:r>
+              </a:p>
+            </c:rich>
+          </c:tx>
+          <c:layout/>
+          <c:overlay val="0"/>
+          <c:spPr>
+            <a:noFill/>
+            <a:ln>
+              <a:noFill/>
+            </a:ln>
+            <a:effectLst/>
+          </c:spPr>
+          <c:txPr>
+            <a:bodyPr rot="0" spcFirstLastPara="1" vertOverflow="ellipsis" vert="horz" wrap="square" anchor="ctr" anchorCtr="1"/>
+            <a:lstStyle/>
+            <a:p>
+              <a:pPr>
+                <a:defRPr sz="1000" b="0" i="0" u="none" strike="noStrike" kern="1200" baseline="0">
+                  <a:solidFill>
+                    <a:schemeClr val="tx1">
+                      <a:lumMod val="65000"/>
+                      <a:lumOff val="35000"/>
+                    </a:schemeClr>
+                  </a:solidFill>
+                  <a:latin typeface="+mn-lt"/>
+                  <a:ea typeface="+mn-ea"/>
+                  <a:cs typeface="+mn-cs"/>
+                </a:defRPr>
+              </a:pPr>
+              <a:endParaRPr lang="en-US"/>
+            </a:p>
+          </c:txPr>
+        </c:title>
+        <c:numFmt formatCode="General" sourceLinked="1"/>
+        <c:majorTickMark val="none"/>
+        <c:minorTickMark val="none"/>
+        <c:tickLblPos val="nextTo"/>
+        <c:spPr>
+          <a:noFill/>
+          <a:ln w="9525" cap="flat" cmpd="sng" algn="ctr">
+            <a:solidFill>
+              <a:schemeClr val="tx1">
+                <a:lumMod val="15000"/>
+                <a:lumOff val="85000"/>
+              </a:schemeClr>
+            </a:solidFill>
+            <a:round/>
+          </a:ln>
+          <a:effectLst/>
+        </c:spPr>
+        <c:txPr>
+          <a:bodyPr rot="-60000000" spcFirstLastPara="1" vertOverflow="ellipsis" vert="horz" wrap="square" anchor="ctr" anchorCtr="1"/>
+          <a:lstStyle/>
+          <a:p>
+            <a:pPr>
+              <a:defRPr sz="900" b="0" i="0" u="none" strike="noStrike" kern="1200" baseline="0">
+                <a:solidFill>
+                  <a:schemeClr val="tx1">
+                    <a:lumMod val="65000"/>
+                    <a:lumOff val="35000"/>
+                  </a:schemeClr>
+                </a:solidFill>
+                <a:latin typeface="+mn-lt"/>
+                <a:ea typeface="+mn-ea"/>
+                <a:cs typeface="+mn-cs"/>
+              </a:defRPr>
+            </a:pPr>
+            <a:endParaRPr lang="en-US"/>
+          </a:p>
+        </c:txPr>
+        <c:crossAx val="1900159024"/>
+        <c:crosses val="autoZero"/>
+        <c:auto val="1"/>
+        <c:lblAlgn val="ctr"/>
+        <c:lblOffset val="100"/>
+        <c:noMultiLvlLbl val="0"/>
+      </c:catAx>
+      <c:valAx>
+        <c:axId val="1900159024"/>
+        <c:scaling>
+          <c:orientation val="minMax"/>
+        </c:scaling>
+        <c:delete val="0"/>
+        <c:axPos val="l"/>
+        <c:majorGridlines>
+          <c:spPr>
+            <a:ln w="9525" cap="flat" cmpd="sng" algn="ctr">
+              <a:solidFill>
+                <a:schemeClr val="tx1">
+                  <a:lumMod val="15000"/>
+                  <a:lumOff val="85000"/>
+                </a:schemeClr>
+              </a:solidFill>
+              <a:round/>
+            </a:ln>
+            <a:effectLst/>
+          </c:spPr>
+        </c:majorGridlines>
+        <c:title>
+          <c:tx>
+            <c:rich>
+              <a:bodyPr rot="-5400000" spcFirstLastPara="1" vertOverflow="ellipsis" vert="horz" wrap="square" anchor="ctr" anchorCtr="1"/>
+              <a:lstStyle/>
+              <a:p>
+                <a:pPr>
+                  <a:defRPr sz="1000" b="0" i="0" u="none" strike="noStrike" kern="1200" baseline="0">
+                    <a:solidFill>
+                      <a:schemeClr val="tx1">
+                        <a:lumMod val="65000"/>
+                        <a:lumOff val="35000"/>
+                      </a:schemeClr>
+                    </a:solidFill>
+                    <a:latin typeface="+mn-lt"/>
+                    <a:ea typeface="+mn-ea"/>
+                    <a:cs typeface="+mn-cs"/>
+                  </a:defRPr>
+                </a:pPr>
+                <a:r>
+                  <a:rPr lang="en-US" dirty="0" smtClean="0"/>
+                  <a:t>Accuracy</a:t>
+                </a:r>
+                <a:endParaRPr lang="en-US" dirty="0"/>
+              </a:p>
+            </c:rich>
+          </c:tx>
+          <c:layout/>
+          <c:overlay val="0"/>
+          <c:spPr>
+            <a:noFill/>
+            <a:ln>
+              <a:noFill/>
+            </a:ln>
+            <a:effectLst/>
+          </c:spPr>
+          <c:txPr>
+            <a:bodyPr rot="-5400000" spcFirstLastPara="1" vertOverflow="ellipsis" vert="horz" wrap="square" anchor="ctr" anchorCtr="1"/>
+            <a:lstStyle/>
+            <a:p>
+              <a:pPr>
+                <a:defRPr sz="1000" b="0" i="0" u="none" strike="noStrike" kern="1200" baseline="0">
+                  <a:solidFill>
+                    <a:schemeClr val="tx1">
+                      <a:lumMod val="65000"/>
+                      <a:lumOff val="35000"/>
+                    </a:schemeClr>
+                  </a:solidFill>
+                  <a:latin typeface="+mn-lt"/>
+                  <a:ea typeface="+mn-ea"/>
+                  <a:cs typeface="+mn-cs"/>
+                </a:defRPr>
+              </a:pPr>
+              <a:endParaRPr lang="en-US"/>
+            </a:p>
+          </c:txPr>
+        </c:title>
+        <c:numFmt formatCode="General" sourceLinked="1"/>
+        <c:majorTickMark val="none"/>
+        <c:minorTickMark val="none"/>
+        <c:tickLblPos val="nextTo"/>
+        <c:spPr>
+          <a:noFill/>
+          <a:ln>
+            <a:noFill/>
+          </a:ln>
+          <a:effectLst/>
+        </c:spPr>
+        <c:txPr>
+          <a:bodyPr rot="-60000000" spcFirstLastPara="1" vertOverflow="ellipsis" vert="horz" wrap="square" anchor="ctr" anchorCtr="1"/>
+          <a:lstStyle/>
+          <a:p>
+            <a:pPr>
+              <a:defRPr sz="900" b="0" i="0" u="none" strike="noStrike" kern="1200" baseline="0">
+                <a:solidFill>
+                  <a:schemeClr val="tx1">
+                    <a:lumMod val="65000"/>
+                    <a:lumOff val="35000"/>
+                  </a:schemeClr>
+                </a:solidFill>
+                <a:latin typeface="+mn-lt"/>
+                <a:ea typeface="+mn-ea"/>
+                <a:cs typeface="+mn-cs"/>
+              </a:defRPr>
+            </a:pPr>
+            <a:endParaRPr lang="en-US"/>
+          </a:p>
+        </c:txPr>
+        <c:crossAx val="1900161200"/>
+        <c:crosses val="autoZero"/>
+        <c:crossBetween val="between"/>
+      </c:valAx>
+      <c:spPr>
+        <a:noFill/>
+        <a:ln>
+          <a:noFill/>
+        </a:ln>
+        <a:effectLst/>
+      </c:spPr>
+    </c:plotArea>
+    <c:plotVisOnly val="1"/>
+    <c:dispBlanksAs val="gap"/>
+    <c:showDLblsOverMax val="0"/>
+  </c:chart>
+  <c:spPr>
+    <a:noFill/>
+    <a:ln>
+      <a:noFill/>
+    </a:ln>
+    <a:effectLst/>
+  </c:spPr>
+  <c:txPr>
+    <a:bodyPr/>
+    <a:lstStyle/>
+    <a:p>
+      <a:pPr>
+        <a:defRPr/>
+      </a:pPr>
+      <a:endParaRPr lang="en-US"/>
+    </a:p>
+  </c:txPr>
+  <c:externalData r:id="rId3">
+    <c:autoUpdate val="0"/>
+  </c:externalData>
+</c:chartSpace>
+</file>
+
+<file path=ppt/charts/chart4.xml><?xml version="1.0" encoding="utf-8"?>
 <c:chartSpace xmlns:c="http://schemas.openxmlformats.org/drawingml/2006/chart" xmlns:a="http://schemas.openxmlformats.org/drawingml/2006/main" xmlns:r="http://schemas.openxmlformats.org/officeDocument/2006/relationships">
   <c:date1904 val="0"/>
   <c:lang val="en-US"/>
@@ -1273,11 +1723,11 @@
           <c:showPercent val="0"/>
           <c:showBubbleSize val="0"/>
         </c:dLbls>
-        <c:axId val="1173542784"/>
-        <c:axId val="1173538432"/>
+        <c:axId val="1900169360"/>
+        <c:axId val="1900160112"/>
       </c:scatterChart>
       <c:valAx>
-        <c:axId val="1173542784"/>
+        <c:axId val="1900169360"/>
         <c:scaling>
           <c:orientation val="minMax"/>
         </c:scaling>
@@ -1301,12 +1751,12 @@
         <c:majorTickMark val="none"/>
         <c:minorTickMark val="none"/>
         <c:tickLblPos val="nextTo"/>
-        <c:crossAx val="1173538432"/>
+        <c:crossAx val="1900160112"/>
         <c:crosses val="autoZero"/>
         <c:crossBetween val="midCat"/>
       </c:valAx>
       <c:valAx>
-        <c:axId val="1173538432"/>
+        <c:axId val="1900160112"/>
         <c:scaling>
           <c:orientation val="minMax"/>
         </c:scaling>
@@ -1425,7 +1875,7 @@
             <a:endParaRPr lang="en-US"/>
           </a:p>
         </c:txPr>
-        <c:crossAx val="1173542784"/>
+        <c:crossAx val="1900169360"/>
         <c:crosses val="autoZero"/>
         <c:crossBetween val="midCat"/>
       </c:valAx>
@@ -1584,6 +2034,46 @@
 </cs:colorStyle>
 </file>
 
+<file path=ppt/charts/colors4.xml><?xml version="1.0" encoding="utf-8"?>
+<cs:colorStyle xmlns:cs="http://schemas.microsoft.com/office/drawing/2012/chartStyle" xmlns:a="http://schemas.openxmlformats.org/drawingml/2006/main" meth="cycle" id="10">
+  <a:schemeClr val="accent1"/>
+  <a:schemeClr val="accent2"/>
+  <a:schemeClr val="accent3"/>
+  <a:schemeClr val="accent4"/>
+  <a:schemeClr val="accent5"/>
+  <a:schemeClr val="accent6"/>
+  <cs:variation/>
+  <cs:variation>
+    <a:lumMod val="60000"/>
+  </cs:variation>
+  <cs:variation>
+    <a:lumMod val="80000"/>
+    <a:lumOff val="20000"/>
+  </cs:variation>
+  <cs:variation>
+    <a:lumMod val="80000"/>
+  </cs:variation>
+  <cs:variation>
+    <a:lumMod val="60000"/>
+    <a:lumOff val="40000"/>
+  </cs:variation>
+  <cs:variation>
+    <a:lumMod val="50000"/>
+  </cs:variation>
+  <cs:variation>
+    <a:lumMod val="70000"/>
+    <a:lumOff val="30000"/>
+  </cs:variation>
+  <cs:variation>
+    <a:lumMod val="70000"/>
+  </cs:variation>
+  <cs:variation>
+    <a:lumMod val="50000"/>
+    <a:lumOff val="50000"/>
+  </cs:variation>
+</cs:colorStyle>
+</file>
+
 <file path=ppt/charts/style1.xml><?xml version="1.0" encoding="utf-8"?>
 <cs:chartStyle xmlns:cs="http://schemas.microsoft.com/office/drawing/2012/chartStyle" xmlns:a="http://schemas.openxmlformats.org/drawingml/2006/main" id="201">
   <cs:axisTitle>
@@ -2591,6 +3081,509 @@
 </file>
 
 <file path=ppt/charts/style3.xml><?xml version="1.0" encoding="utf-8"?>
+<cs:chartStyle xmlns:cs="http://schemas.microsoft.com/office/drawing/2012/chartStyle" xmlns:a="http://schemas.openxmlformats.org/drawingml/2006/main" id="201">
+  <cs:axisTitle>
+    <cs:lnRef idx="0"/>
+    <cs:fillRef idx="0"/>
+    <cs:effectRef idx="0"/>
+    <cs:fontRef idx="minor">
+      <a:schemeClr val="tx1">
+        <a:lumMod val="65000"/>
+        <a:lumOff val="35000"/>
+      </a:schemeClr>
+    </cs:fontRef>
+    <cs:defRPr sz="1000" kern="1200"/>
+  </cs:axisTitle>
+  <cs:categoryAxis>
+    <cs:lnRef idx="0"/>
+    <cs:fillRef idx="0"/>
+    <cs:effectRef idx="0"/>
+    <cs:fontRef idx="minor">
+      <a:schemeClr val="tx1">
+        <a:lumMod val="65000"/>
+        <a:lumOff val="35000"/>
+      </a:schemeClr>
+    </cs:fontRef>
+    <cs:spPr>
+      <a:ln w="9525" cap="flat" cmpd="sng" algn="ctr">
+        <a:solidFill>
+          <a:schemeClr val="tx1">
+            <a:lumMod val="15000"/>
+            <a:lumOff val="85000"/>
+          </a:schemeClr>
+        </a:solidFill>
+        <a:round/>
+      </a:ln>
+    </cs:spPr>
+    <cs:defRPr sz="900" kern="1200"/>
+  </cs:categoryAxis>
+  <cs:chartArea mods="allowNoFillOverride allowNoLineOverride">
+    <cs:lnRef idx="0"/>
+    <cs:fillRef idx="0"/>
+    <cs:effectRef idx="0"/>
+    <cs:fontRef idx="minor">
+      <a:schemeClr val="tx1"/>
+    </cs:fontRef>
+    <cs:spPr>
+      <a:solidFill>
+        <a:schemeClr val="bg1"/>
+      </a:solidFill>
+      <a:ln w="9525" cap="flat" cmpd="sng" algn="ctr">
+        <a:solidFill>
+          <a:schemeClr val="tx1">
+            <a:lumMod val="15000"/>
+            <a:lumOff val="85000"/>
+          </a:schemeClr>
+        </a:solidFill>
+        <a:round/>
+      </a:ln>
+    </cs:spPr>
+    <cs:defRPr sz="1000" kern="1200"/>
+  </cs:chartArea>
+  <cs:dataLabel>
+    <cs:lnRef idx="0"/>
+    <cs:fillRef idx="0"/>
+    <cs:effectRef idx="0"/>
+    <cs:fontRef idx="minor">
+      <a:schemeClr val="tx1">
+        <a:lumMod val="75000"/>
+        <a:lumOff val="25000"/>
+      </a:schemeClr>
+    </cs:fontRef>
+    <cs:defRPr sz="900" kern="1200"/>
+  </cs:dataLabel>
+  <cs:dataLabelCallout>
+    <cs:lnRef idx="0"/>
+    <cs:fillRef idx="0"/>
+    <cs:effectRef idx="0"/>
+    <cs:fontRef idx="minor">
+      <a:schemeClr val="dk1">
+        <a:lumMod val="65000"/>
+        <a:lumOff val="35000"/>
+      </a:schemeClr>
+    </cs:fontRef>
+    <cs:spPr>
+      <a:solidFill>
+        <a:schemeClr val="lt1"/>
+      </a:solidFill>
+      <a:ln>
+        <a:solidFill>
+          <a:schemeClr val="dk1">
+            <a:lumMod val="25000"/>
+            <a:lumOff val="75000"/>
+          </a:schemeClr>
+        </a:solidFill>
+      </a:ln>
+    </cs:spPr>
+    <cs:defRPr sz="900" kern="1200"/>
+    <cs:bodyPr rot="0" spcFirstLastPara="1" vertOverflow="clip" horzOverflow="clip" vert="horz" wrap="square" lIns="36576" tIns="18288" rIns="36576" bIns="18288" anchor="ctr" anchorCtr="1">
+      <a:spAutoFit/>
+    </cs:bodyPr>
+  </cs:dataLabelCallout>
+  <cs:dataPoint>
+    <cs:lnRef idx="0"/>
+    <cs:fillRef idx="1">
+      <cs:styleClr val="auto"/>
+    </cs:fillRef>
+    <cs:effectRef idx="0"/>
+    <cs:fontRef idx="minor">
+      <a:schemeClr val="tx1"/>
+    </cs:fontRef>
+  </cs:dataPoint>
+  <cs:dataPoint3D>
+    <cs:lnRef idx="0"/>
+    <cs:fillRef idx="1">
+      <cs:styleClr val="auto"/>
+    </cs:fillRef>
+    <cs:effectRef idx="0"/>
+    <cs:fontRef idx="minor">
+      <a:schemeClr val="tx1"/>
+    </cs:fontRef>
+  </cs:dataPoint3D>
+  <cs:dataPointLine>
+    <cs:lnRef idx="0">
+      <cs:styleClr val="auto"/>
+    </cs:lnRef>
+    <cs:fillRef idx="1"/>
+    <cs:effectRef idx="0"/>
+    <cs:fontRef idx="minor">
+      <a:schemeClr val="tx1"/>
+    </cs:fontRef>
+    <cs:spPr>
+      <a:ln w="28575" cap="rnd">
+        <a:solidFill>
+          <a:schemeClr val="phClr"/>
+        </a:solidFill>
+        <a:round/>
+      </a:ln>
+    </cs:spPr>
+  </cs:dataPointLine>
+  <cs:dataPointMarker>
+    <cs:lnRef idx="0">
+      <cs:styleClr val="auto"/>
+    </cs:lnRef>
+    <cs:fillRef idx="1">
+      <cs:styleClr val="auto"/>
+    </cs:fillRef>
+    <cs:effectRef idx="0"/>
+    <cs:fontRef idx="minor">
+      <a:schemeClr val="tx1"/>
+    </cs:fontRef>
+    <cs:spPr>
+      <a:ln w="9525">
+        <a:solidFill>
+          <a:schemeClr val="phClr"/>
+        </a:solidFill>
+      </a:ln>
+    </cs:spPr>
+  </cs:dataPointMarker>
+  <cs:dataPointMarkerLayout symbol="circle" size="5"/>
+  <cs:dataPointWireframe>
+    <cs:lnRef idx="0">
+      <cs:styleClr val="auto"/>
+    </cs:lnRef>
+    <cs:fillRef idx="1"/>
+    <cs:effectRef idx="0"/>
+    <cs:fontRef idx="minor">
+      <a:schemeClr val="tx1"/>
+    </cs:fontRef>
+    <cs:spPr>
+      <a:ln w="9525" cap="rnd">
+        <a:solidFill>
+          <a:schemeClr val="phClr"/>
+        </a:solidFill>
+        <a:round/>
+      </a:ln>
+    </cs:spPr>
+  </cs:dataPointWireframe>
+  <cs:dataTable>
+    <cs:lnRef idx="0"/>
+    <cs:fillRef idx="0"/>
+    <cs:effectRef idx="0"/>
+    <cs:fontRef idx="minor">
+      <a:schemeClr val="tx1">
+        <a:lumMod val="65000"/>
+        <a:lumOff val="35000"/>
+      </a:schemeClr>
+    </cs:fontRef>
+    <cs:spPr>
+      <a:noFill/>
+      <a:ln w="9525" cap="flat" cmpd="sng" algn="ctr">
+        <a:solidFill>
+          <a:schemeClr val="tx1">
+            <a:lumMod val="15000"/>
+            <a:lumOff val="85000"/>
+          </a:schemeClr>
+        </a:solidFill>
+        <a:round/>
+      </a:ln>
+    </cs:spPr>
+    <cs:defRPr sz="900" kern="1200"/>
+  </cs:dataTable>
+  <cs:downBar>
+    <cs:lnRef idx="0"/>
+    <cs:fillRef idx="0"/>
+    <cs:effectRef idx="0"/>
+    <cs:fontRef idx="minor">
+      <a:schemeClr val="dk1"/>
+    </cs:fontRef>
+    <cs:spPr>
+      <a:solidFill>
+        <a:schemeClr val="dk1">
+          <a:lumMod val="65000"/>
+          <a:lumOff val="35000"/>
+        </a:schemeClr>
+      </a:solidFill>
+      <a:ln w="9525">
+        <a:solidFill>
+          <a:schemeClr val="tx1">
+            <a:lumMod val="65000"/>
+            <a:lumOff val="35000"/>
+          </a:schemeClr>
+        </a:solidFill>
+      </a:ln>
+    </cs:spPr>
+  </cs:downBar>
+  <cs:dropLine>
+    <cs:lnRef idx="0"/>
+    <cs:fillRef idx="0"/>
+    <cs:effectRef idx="0"/>
+    <cs:fontRef idx="minor">
+      <a:schemeClr val="tx1"/>
+    </cs:fontRef>
+    <cs:spPr>
+      <a:ln w="9525" cap="flat" cmpd="sng" algn="ctr">
+        <a:solidFill>
+          <a:schemeClr val="tx1">
+            <a:lumMod val="35000"/>
+            <a:lumOff val="65000"/>
+          </a:schemeClr>
+        </a:solidFill>
+        <a:round/>
+      </a:ln>
+    </cs:spPr>
+  </cs:dropLine>
+  <cs:errorBar>
+    <cs:lnRef idx="0"/>
+    <cs:fillRef idx="0"/>
+    <cs:effectRef idx="0"/>
+    <cs:fontRef idx="minor">
+      <a:schemeClr val="tx1"/>
+    </cs:fontRef>
+    <cs:spPr>
+      <a:ln w="9525" cap="flat" cmpd="sng" algn="ctr">
+        <a:solidFill>
+          <a:schemeClr val="tx1">
+            <a:lumMod val="65000"/>
+            <a:lumOff val="35000"/>
+          </a:schemeClr>
+        </a:solidFill>
+        <a:round/>
+      </a:ln>
+    </cs:spPr>
+  </cs:errorBar>
+  <cs:floor>
+    <cs:lnRef idx="0"/>
+    <cs:fillRef idx="0"/>
+    <cs:effectRef idx="0"/>
+    <cs:fontRef idx="minor">
+      <a:schemeClr val="tx1"/>
+    </cs:fontRef>
+    <cs:spPr>
+      <a:noFill/>
+      <a:ln>
+        <a:noFill/>
+      </a:ln>
+    </cs:spPr>
+  </cs:floor>
+  <cs:gridlineMajor>
+    <cs:lnRef idx="0"/>
+    <cs:fillRef idx="0"/>
+    <cs:effectRef idx="0"/>
+    <cs:fontRef idx="minor">
+      <a:schemeClr val="tx1"/>
+    </cs:fontRef>
+    <cs:spPr>
+      <a:ln w="9525" cap="flat" cmpd="sng" algn="ctr">
+        <a:solidFill>
+          <a:schemeClr val="tx1">
+            <a:lumMod val="15000"/>
+            <a:lumOff val="85000"/>
+          </a:schemeClr>
+        </a:solidFill>
+        <a:round/>
+      </a:ln>
+    </cs:spPr>
+  </cs:gridlineMajor>
+  <cs:gridlineMinor>
+    <cs:lnRef idx="0"/>
+    <cs:fillRef idx="0"/>
+    <cs:effectRef idx="0"/>
+    <cs:fontRef idx="minor">
+      <a:schemeClr val="tx1"/>
+    </cs:fontRef>
+    <cs:spPr>
+      <a:ln w="9525" cap="flat" cmpd="sng" algn="ctr">
+        <a:solidFill>
+          <a:schemeClr val="tx1">
+            <a:lumMod val="5000"/>
+            <a:lumOff val="95000"/>
+          </a:schemeClr>
+        </a:solidFill>
+        <a:round/>
+      </a:ln>
+    </cs:spPr>
+  </cs:gridlineMinor>
+  <cs:hiLoLine>
+    <cs:lnRef idx="0"/>
+    <cs:fillRef idx="0"/>
+    <cs:effectRef idx="0"/>
+    <cs:fontRef idx="minor">
+      <a:schemeClr val="tx1"/>
+    </cs:fontRef>
+    <cs:spPr>
+      <a:ln w="9525" cap="flat" cmpd="sng" algn="ctr">
+        <a:solidFill>
+          <a:schemeClr val="tx1">
+            <a:lumMod val="75000"/>
+            <a:lumOff val="25000"/>
+          </a:schemeClr>
+        </a:solidFill>
+        <a:round/>
+      </a:ln>
+    </cs:spPr>
+  </cs:hiLoLine>
+  <cs:leaderLine>
+    <cs:lnRef idx="0"/>
+    <cs:fillRef idx="0"/>
+    <cs:effectRef idx="0"/>
+    <cs:fontRef idx="minor">
+      <a:schemeClr val="tx1"/>
+    </cs:fontRef>
+    <cs:spPr>
+      <a:ln w="9525" cap="flat" cmpd="sng" algn="ctr">
+        <a:solidFill>
+          <a:schemeClr val="tx1">
+            <a:lumMod val="35000"/>
+            <a:lumOff val="65000"/>
+          </a:schemeClr>
+        </a:solidFill>
+        <a:round/>
+      </a:ln>
+    </cs:spPr>
+  </cs:leaderLine>
+  <cs:legend>
+    <cs:lnRef idx="0"/>
+    <cs:fillRef idx="0"/>
+    <cs:effectRef idx="0"/>
+    <cs:fontRef idx="minor">
+      <a:schemeClr val="tx1">
+        <a:lumMod val="65000"/>
+        <a:lumOff val="35000"/>
+      </a:schemeClr>
+    </cs:fontRef>
+    <cs:defRPr sz="900" kern="1200"/>
+  </cs:legend>
+  <cs:plotArea mods="allowNoFillOverride allowNoLineOverride">
+    <cs:lnRef idx="0"/>
+    <cs:fillRef idx="0"/>
+    <cs:effectRef idx="0"/>
+    <cs:fontRef idx="minor">
+      <a:schemeClr val="tx1"/>
+    </cs:fontRef>
+  </cs:plotArea>
+  <cs:plotArea3D mods="allowNoFillOverride allowNoLineOverride">
+    <cs:lnRef idx="0"/>
+    <cs:fillRef idx="0"/>
+    <cs:effectRef idx="0"/>
+    <cs:fontRef idx="minor">
+      <a:schemeClr val="tx1"/>
+    </cs:fontRef>
+  </cs:plotArea3D>
+  <cs:seriesAxis>
+    <cs:lnRef idx="0"/>
+    <cs:fillRef idx="0"/>
+    <cs:effectRef idx="0"/>
+    <cs:fontRef idx="minor">
+      <a:schemeClr val="tx1">
+        <a:lumMod val="65000"/>
+        <a:lumOff val="35000"/>
+      </a:schemeClr>
+    </cs:fontRef>
+    <cs:defRPr sz="900" kern="1200"/>
+  </cs:seriesAxis>
+  <cs:seriesLine>
+    <cs:lnRef idx="0"/>
+    <cs:fillRef idx="0"/>
+    <cs:effectRef idx="0"/>
+    <cs:fontRef idx="minor">
+      <a:schemeClr val="tx1"/>
+    </cs:fontRef>
+    <cs:spPr>
+      <a:ln w="9525" cap="flat" cmpd="sng" algn="ctr">
+        <a:solidFill>
+          <a:schemeClr val="tx1">
+            <a:lumMod val="35000"/>
+            <a:lumOff val="65000"/>
+          </a:schemeClr>
+        </a:solidFill>
+        <a:round/>
+      </a:ln>
+    </cs:spPr>
+  </cs:seriesLine>
+  <cs:title>
+    <cs:lnRef idx="0"/>
+    <cs:fillRef idx="0"/>
+    <cs:effectRef idx="0"/>
+    <cs:fontRef idx="minor">
+      <a:schemeClr val="tx1">
+        <a:lumMod val="65000"/>
+        <a:lumOff val="35000"/>
+      </a:schemeClr>
+    </cs:fontRef>
+    <cs:defRPr sz="1400" b="0" kern="1200" spc="0" baseline="0"/>
+  </cs:title>
+  <cs:trendline>
+    <cs:lnRef idx="0">
+      <cs:styleClr val="auto"/>
+    </cs:lnRef>
+    <cs:fillRef idx="0"/>
+    <cs:effectRef idx="0"/>
+    <cs:fontRef idx="minor">
+      <a:schemeClr val="tx1"/>
+    </cs:fontRef>
+    <cs:spPr>
+      <a:ln w="19050" cap="rnd">
+        <a:solidFill>
+          <a:schemeClr val="phClr"/>
+        </a:solidFill>
+        <a:prstDash val="sysDot"/>
+      </a:ln>
+    </cs:spPr>
+  </cs:trendline>
+  <cs:trendlineLabel>
+    <cs:lnRef idx="0"/>
+    <cs:fillRef idx="0"/>
+    <cs:effectRef idx="0"/>
+    <cs:fontRef idx="minor">
+      <a:schemeClr val="tx1">
+        <a:lumMod val="65000"/>
+        <a:lumOff val="35000"/>
+      </a:schemeClr>
+    </cs:fontRef>
+    <cs:defRPr sz="900" kern="1200"/>
+  </cs:trendlineLabel>
+  <cs:upBar>
+    <cs:lnRef idx="0"/>
+    <cs:fillRef idx="0"/>
+    <cs:effectRef idx="0"/>
+    <cs:fontRef idx="minor">
+      <a:schemeClr val="dk1"/>
+    </cs:fontRef>
+    <cs:spPr>
+      <a:solidFill>
+        <a:schemeClr val="lt1"/>
+      </a:solidFill>
+      <a:ln w="9525">
+        <a:solidFill>
+          <a:schemeClr val="tx1">
+            <a:lumMod val="15000"/>
+            <a:lumOff val="85000"/>
+          </a:schemeClr>
+        </a:solidFill>
+      </a:ln>
+    </cs:spPr>
+  </cs:upBar>
+  <cs:valueAxis>
+    <cs:lnRef idx="0"/>
+    <cs:fillRef idx="0"/>
+    <cs:effectRef idx="0"/>
+    <cs:fontRef idx="minor">
+      <a:schemeClr val="tx1">
+        <a:lumMod val="65000"/>
+        <a:lumOff val="35000"/>
+      </a:schemeClr>
+    </cs:fontRef>
+    <cs:defRPr sz="900" kern="1200"/>
+  </cs:valueAxis>
+  <cs:wall>
+    <cs:lnRef idx="0"/>
+    <cs:fillRef idx="0"/>
+    <cs:effectRef idx="0"/>
+    <cs:fontRef idx="minor">
+      <a:schemeClr val="tx1"/>
+    </cs:fontRef>
+    <cs:spPr>
+      <a:noFill/>
+      <a:ln>
+        <a:noFill/>
+      </a:ln>
+    </cs:spPr>
+  </cs:wall>
+</cs:chartStyle>
+</file>
+
+<file path=ppt/charts/style4.xml><?xml version="1.0" encoding="utf-8"?>
 <cs:chartStyle xmlns:cs="http://schemas.microsoft.com/office/drawing/2012/chartStyle" xmlns:a="http://schemas.openxmlformats.org/drawingml/2006/main" id="240">
   <cs:axisTitle>
     <cs:lnRef idx="0"/>
@@ -3313,7 +4306,7 @@
           <a:p>
             <a:fld id="{EB517853-C5D0-4D14-877E-21DC998D7767}" type="datetimeFigureOut">
               <a:rPr lang="en-US" smtClean="0"/>
-              <a:t>3/12/2013</a:t>
+              <a:t>5/14/2013</a:t>
             </a:fld>
             <a:endParaRPr lang="en-US"/>
           </a:p>
@@ -3505,7 +4498,7 @@
           <a:p>
             <a:fld id="{EB517853-C5D0-4D14-877E-21DC998D7767}" type="datetimeFigureOut">
               <a:rPr lang="en-US" smtClean="0"/>
-              <a:t>3/12/2013</a:t>
+              <a:t>5/14/2013</a:t>
             </a:fld>
             <a:endParaRPr lang="en-US"/>
           </a:p>
@@ -3685,7 +4678,7 @@
           <a:p>
             <a:fld id="{EB517853-C5D0-4D14-877E-21DC998D7767}" type="datetimeFigureOut">
               <a:rPr lang="en-US" smtClean="0"/>
-              <a:t>3/12/2013</a:t>
+              <a:t>5/14/2013</a:t>
             </a:fld>
             <a:endParaRPr lang="en-US"/>
           </a:p>
@@ -3855,7 +4848,7 @@
           <a:p>
             <a:fld id="{EB517853-C5D0-4D14-877E-21DC998D7767}" type="datetimeFigureOut">
               <a:rPr lang="en-US" smtClean="0"/>
-              <a:t>3/12/2013</a:t>
+              <a:t>5/14/2013</a:t>
             </a:fld>
             <a:endParaRPr lang="en-US"/>
           </a:p>
@@ -4109,7 +5102,7 @@
           <a:p>
             <a:fld id="{EB517853-C5D0-4D14-877E-21DC998D7767}" type="datetimeFigureOut">
               <a:rPr lang="en-US" smtClean="0"/>
-              <a:t>3/12/2013</a:t>
+              <a:t>5/14/2013</a:t>
             </a:fld>
             <a:endParaRPr lang="en-US"/>
           </a:p>
@@ -4435,7 +5428,7 @@
           <a:p>
             <a:fld id="{EB517853-C5D0-4D14-877E-21DC998D7767}" type="datetimeFigureOut">
               <a:rPr lang="en-US" smtClean="0"/>
-              <a:t>3/12/2013</a:t>
+              <a:t>5/14/2013</a:t>
             </a:fld>
             <a:endParaRPr lang="en-US"/>
           </a:p>
@@ -4855,7 +5848,7 @@
           <a:p>
             <a:fld id="{EB517853-C5D0-4D14-877E-21DC998D7767}" type="datetimeFigureOut">
               <a:rPr lang="en-US" smtClean="0"/>
-              <a:t>3/12/2013</a:t>
+              <a:t>5/14/2013</a:t>
             </a:fld>
             <a:endParaRPr lang="en-US"/>
           </a:p>
@@ -4973,7 +5966,7 @@
           <a:p>
             <a:fld id="{EB517853-C5D0-4D14-877E-21DC998D7767}" type="datetimeFigureOut">
               <a:rPr lang="en-US" smtClean="0"/>
-              <a:t>3/12/2013</a:t>
+              <a:t>5/14/2013</a:t>
             </a:fld>
             <a:endParaRPr lang="en-US"/>
           </a:p>
@@ -5068,7 +6061,7 @@
           <a:p>
             <a:fld id="{EB517853-C5D0-4D14-877E-21DC998D7767}" type="datetimeFigureOut">
               <a:rPr lang="en-US" smtClean="0"/>
-              <a:t>3/12/2013</a:t>
+              <a:t>5/14/2013</a:t>
             </a:fld>
             <a:endParaRPr lang="en-US"/>
           </a:p>
@@ -5355,7 +6348,7 @@
           <a:p>
             <a:fld id="{EB517853-C5D0-4D14-877E-21DC998D7767}" type="datetimeFigureOut">
               <a:rPr lang="en-US" smtClean="0"/>
-              <a:t>3/12/2013</a:t>
+              <a:t>5/14/2013</a:t>
             </a:fld>
             <a:endParaRPr lang="en-US"/>
           </a:p>
@@ -5680,7 +6673,7 @@
           <a:p>
             <a:fld id="{EB517853-C5D0-4D14-877E-21DC998D7767}" type="datetimeFigureOut">
               <a:rPr lang="en-US" smtClean="0"/>
-              <a:t>3/12/2013</a:t>
+              <a:t>5/14/2013</a:t>
             </a:fld>
             <a:endParaRPr lang="en-US"/>
           </a:p>
@@ -5934,7 +6927,7 @@
           <a:p>
             <a:fld id="{EB517853-C5D0-4D14-877E-21DC998D7767}" type="datetimeFigureOut">
               <a:rPr lang="en-US" smtClean="0"/>
-              <a:t>3/12/2013</a:t>
+              <a:t>5/14/2013</a:t>
             </a:fld>
             <a:endParaRPr lang="en-US"/>
           </a:p>
@@ -6524,8 +7517,324 @@
           <a:lstStyle/>
           <a:p>
             <a:r>
+              <a:rPr lang="en-US" dirty="0"/>
+              <a:t>Evaluation (continued)</a:t>
+            </a:r>
+          </a:p>
+        </p:txBody>
+      </p:sp>
+      <p:sp>
+        <p:nvSpPr>
+          <p:cNvPr id="4" name="Content Placeholder 3"/>
+          <p:cNvSpPr>
+            <a:spLocks noGrp="1"/>
+          </p:cNvSpPr>
+          <p:nvPr>
+            <p:ph sz="half" idx="1"/>
+          </p:nvPr>
+        </p:nvSpPr>
+        <p:spPr/>
+        <p:txBody>
+          <a:bodyPr/>
+          <a:lstStyle/>
+          <a:p>
+            <a:r>
               <a:rPr lang="en-US" dirty="0" smtClean="0"/>
-              <a:t>Statistics</a:t>
+              <a:t>Twitter based Influence Prediction provides the optimal results</a:t>
+            </a:r>
+          </a:p>
+          <a:p>
+            <a:r>
+              <a:rPr lang="en-US" dirty="0" smtClean="0"/>
+              <a:t>Stock data seems to add additional noise into the system</a:t>
+            </a:r>
+          </a:p>
+          <a:p>
+            <a:r>
+              <a:rPr lang="en-US" dirty="0" smtClean="0"/>
+              <a:t>Matches the findings of the </a:t>
+            </a:r>
+            <a:r>
+              <a:rPr lang="en-US" dirty="0"/>
+              <a:t>Ruiz, Castillo et al.</a:t>
+            </a:r>
+            <a:endParaRPr lang="en-US" dirty="0"/>
+          </a:p>
+        </p:txBody>
+      </p:sp>
+      <p:graphicFrame>
+        <p:nvGraphicFramePr>
+          <p:cNvPr id="6" name="Content Placeholder 5"/>
+          <p:cNvGraphicFramePr>
+            <a:graphicFrameLocks noGrp="1"/>
+          </p:cNvGraphicFramePr>
+          <p:nvPr>
+            <p:ph sz="half" idx="2"/>
+            <p:extLst>
+              <p:ext uri="{D42A27DB-BD31-4B8C-83A1-F6EECF244321}">
+                <p14:modId xmlns:p14="http://schemas.microsoft.com/office/powerpoint/2010/main" val="2322177788"/>
+              </p:ext>
+            </p:extLst>
+          </p:nvPr>
+        </p:nvGraphicFramePr>
+        <p:xfrm>
+          <a:off x="4594225" y="1828802"/>
+          <a:ext cx="3360737" cy="4351336"/>
+        </p:xfrm>
+        <a:graphic>
+          <a:graphicData uri="http://schemas.openxmlformats.org/drawingml/2006/table">
+            <a:tbl>
+              <a:tblPr>
+                <a:tableStyleId>{5C22544A-7EE6-4342-B048-85BDC9FD1C3A}</a:tableStyleId>
+              </a:tblPr>
+              <a:tblGrid>
+                <a:gridCol w="2187575"/>
+                <a:gridCol w="1173162"/>
+              </a:tblGrid>
+              <a:tr h="974740">
+                <a:tc>
+                  <a:txBody>
+                    <a:bodyPr/>
+                    <a:lstStyle/>
+                    <a:p>
+                      <a:pPr algn="ctr" fontAlgn="b"/>
+                      <a:r>
+                        <a:rPr lang="en-US" sz="1600" u="none" strike="noStrike" dirty="0">
+                          <a:effectLst/>
+                        </a:rPr>
+                        <a:t>Method</a:t>
+                      </a:r>
+                      <a:endParaRPr lang="en-US" sz="1600" b="0" i="0" u="none" strike="noStrike" dirty="0">
+                        <a:solidFill>
+                          <a:srgbClr val="000000"/>
+                        </a:solidFill>
+                        <a:effectLst/>
+                        <a:latin typeface="Calibri" panose="020F0502020204030204" pitchFamily="34" charset="0"/>
+                      </a:endParaRPr>
+                    </a:p>
+                  </a:txBody>
+                  <a:tcPr marL="7951" marR="7951" marT="7951" marB="0" anchor="b"/>
+                </a:tc>
+                <a:tc>
+                  <a:txBody>
+                    <a:bodyPr/>
+                    <a:lstStyle/>
+                    <a:p>
+                      <a:pPr algn="ctr" fontAlgn="b"/>
+                      <a:r>
+                        <a:rPr lang="en-US" sz="1600" u="none" strike="noStrike">
+                          <a:effectLst/>
+                        </a:rPr>
+                        <a:t>Best Prediction</a:t>
+                      </a:r>
+                      <a:endParaRPr lang="en-US" sz="1600" b="0" i="0" u="none" strike="noStrike">
+                        <a:solidFill>
+                          <a:srgbClr val="000000"/>
+                        </a:solidFill>
+                        <a:effectLst/>
+                        <a:latin typeface="Calibri" panose="020F0502020204030204" pitchFamily="34" charset="0"/>
+                      </a:endParaRPr>
+                    </a:p>
+                  </a:txBody>
+                  <a:tcPr marL="7951" marR="7951" marT="7951" marB="0" anchor="b"/>
+                </a:tc>
+              </a:tr>
+              <a:tr h="894460">
+                <a:tc>
+                  <a:txBody>
+                    <a:bodyPr/>
+                    <a:lstStyle/>
+                    <a:p>
+                      <a:pPr algn="ctr" fontAlgn="b"/>
+                      <a:r>
+                        <a:rPr lang="en-US" sz="1600" u="none" strike="noStrike">
+                          <a:effectLst/>
+                        </a:rPr>
+                        <a:t>Evaluation with Influence as Features</a:t>
+                      </a:r>
+                      <a:endParaRPr lang="en-US" sz="1600" b="0" i="0" u="none" strike="noStrike">
+                        <a:solidFill>
+                          <a:srgbClr val="000000"/>
+                        </a:solidFill>
+                        <a:effectLst/>
+                        <a:latin typeface="Calibri" panose="020F0502020204030204" pitchFamily="34" charset="0"/>
+                      </a:endParaRPr>
+                    </a:p>
+                  </a:txBody>
+                  <a:tcPr marL="7951" marR="7951" marT="7951" marB="0" anchor="b"/>
+                </a:tc>
+                <a:tc>
+                  <a:txBody>
+                    <a:bodyPr/>
+                    <a:lstStyle/>
+                    <a:p>
+                      <a:pPr algn="ctr" fontAlgn="b"/>
+                      <a:r>
+                        <a:rPr lang="en-US" sz="1600" u="none" strike="noStrike">
+                          <a:effectLst/>
+                        </a:rPr>
+                        <a:t>0.53</a:t>
+                      </a:r>
+                      <a:endParaRPr lang="en-US" sz="1600" b="0" i="0" u="none" strike="noStrike">
+                        <a:solidFill>
+                          <a:srgbClr val="000000"/>
+                        </a:solidFill>
+                        <a:effectLst/>
+                        <a:latin typeface="Calibri" panose="020F0502020204030204" pitchFamily="34" charset="0"/>
+                      </a:endParaRPr>
+                    </a:p>
+                  </a:txBody>
+                  <a:tcPr marL="7951" marR="7951" marT="7951" marB="0" anchor="b"/>
+                </a:tc>
+              </a:tr>
+              <a:tr h="1587676">
+                <a:tc>
+                  <a:txBody>
+                    <a:bodyPr/>
+                    <a:lstStyle/>
+                    <a:p>
+                      <a:pPr algn="ctr" rtl="0" fontAlgn="ctr"/>
+                      <a:r>
+                        <a:rPr lang="en-US" sz="1600" u="none" strike="noStrike" dirty="0">
+                          <a:effectLst/>
+                        </a:rPr>
+                        <a:t>Evaluation with Influence and Stock Data as Features</a:t>
+                      </a:r>
+                      <a:endParaRPr lang="en-US" sz="1600" b="0" i="0" u="none" strike="noStrike" dirty="0">
+                        <a:solidFill>
+                          <a:srgbClr val="000000"/>
+                        </a:solidFill>
+                        <a:effectLst/>
+                        <a:latin typeface="Calibri" panose="020F0502020204030204" pitchFamily="34" charset="0"/>
+                      </a:endParaRPr>
+                    </a:p>
+                  </a:txBody>
+                  <a:tcPr marL="7951" marR="7951" marT="7951" marB="0" anchor="ctr"/>
+                </a:tc>
+                <a:tc>
+                  <a:txBody>
+                    <a:bodyPr/>
+                    <a:lstStyle/>
+                    <a:p>
+                      <a:pPr algn="ctr" fontAlgn="b"/>
+                      <a:r>
+                        <a:rPr lang="en-US" sz="1600" u="none" strike="noStrike">
+                          <a:effectLst/>
+                        </a:rPr>
+                        <a:t>0.525</a:t>
+                      </a:r>
+                      <a:endParaRPr lang="en-US" sz="1600" b="0" i="0" u="none" strike="noStrike">
+                        <a:solidFill>
+                          <a:srgbClr val="000000"/>
+                        </a:solidFill>
+                        <a:effectLst/>
+                        <a:latin typeface="Calibri" panose="020F0502020204030204" pitchFamily="34" charset="0"/>
+                      </a:endParaRPr>
+                    </a:p>
+                  </a:txBody>
+                  <a:tcPr marL="7951" marR="7951" marT="7951" marB="0" anchor="b"/>
+                </a:tc>
+              </a:tr>
+              <a:tr h="894460">
+                <a:tc>
+                  <a:txBody>
+                    <a:bodyPr/>
+                    <a:lstStyle/>
+                    <a:p>
+                      <a:pPr algn="ctr" rtl="0" fontAlgn="ctr"/>
+                      <a:r>
+                        <a:rPr lang="en-US" sz="1600" u="none" strike="noStrike" dirty="0">
+                          <a:effectLst/>
+                        </a:rPr>
+                        <a:t>Evaluation with Filtered Influence (Twitter Only)</a:t>
+                      </a:r>
+                      <a:endParaRPr lang="en-US" sz="1600" b="0" i="0" u="none" strike="noStrike" dirty="0">
+                        <a:solidFill>
+                          <a:srgbClr val="000000"/>
+                        </a:solidFill>
+                        <a:effectLst/>
+                        <a:latin typeface="Calibri" panose="020F0502020204030204" pitchFamily="34" charset="0"/>
+                      </a:endParaRPr>
+                    </a:p>
+                  </a:txBody>
+                  <a:tcPr marL="7951" marR="7951" marT="7951" marB="0" anchor="ctr"/>
+                </a:tc>
+                <a:tc>
+                  <a:txBody>
+                    <a:bodyPr/>
+                    <a:lstStyle/>
+                    <a:p>
+                      <a:pPr algn="ctr" fontAlgn="b"/>
+                      <a:r>
+                        <a:rPr lang="en-US" sz="1600" u="none" strike="noStrike" dirty="0">
+                          <a:effectLst/>
+                        </a:rPr>
+                        <a:t>0.56</a:t>
+                      </a:r>
+                      <a:endParaRPr lang="en-US" sz="1600" b="0" i="0" u="none" strike="noStrike" dirty="0">
+                        <a:solidFill>
+                          <a:srgbClr val="000000"/>
+                        </a:solidFill>
+                        <a:effectLst/>
+                        <a:latin typeface="Calibri" panose="020F0502020204030204" pitchFamily="34" charset="0"/>
+                      </a:endParaRPr>
+                    </a:p>
+                  </a:txBody>
+                  <a:tcPr marL="7951" marR="7951" marT="7951" marB="0" anchor="b"/>
+                </a:tc>
+              </a:tr>
+            </a:tbl>
+          </a:graphicData>
+        </a:graphic>
+      </p:graphicFrame>
+    </p:spTree>
+    <p:extLst>
+      <p:ext uri="{BB962C8B-B14F-4D97-AF65-F5344CB8AC3E}">
+        <p14:creationId xmlns:p14="http://schemas.microsoft.com/office/powerpoint/2010/main" val="1955454047"/>
+      </p:ext>
+    </p:extLst>
+  </p:cSld>
+  <p:clrMapOvr>
+    <a:masterClrMapping/>
+  </p:clrMapOvr>
+</p:sld>
+</file>
+
+<file path=ppt/slides/slide11.xml><?xml version="1.0" encoding="utf-8"?>
+<p:sld xmlns:a="http://schemas.openxmlformats.org/drawingml/2006/main" xmlns:r="http://schemas.openxmlformats.org/officeDocument/2006/relationships" xmlns:p="http://schemas.openxmlformats.org/presentationml/2006/main">
+  <p:cSld>
+    <p:spTree>
+      <p:nvGrpSpPr>
+        <p:cNvPr id="1" name=""/>
+        <p:cNvGrpSpPr/>
+        <p:nvPr/>
+      </p:nvGrpSpPr>
+      <p:grpSpPr>
+        <a:xfrm>
+          <a:off x="0" y="0"/>
+          <a:ext cx="0" cy="0"/>
+          <a:chOff x="0" y="0"/>
+          <a:chExt cx="0" cy="0"/>
+        </a:xfrm>
+      </p:grpSpPr>
+      <p:sp>
+        <p:nvSpPr>
+          <p:cNvPr id="2" name="Title 1"/>
+          <p:cNvSpPr>
+            <a:spLocks noGrp="1"/>
+          </p:cNvSpPr>
+          <p:nvPr>
+            <p:ph type="title"/>
+          </p:nvPr>
+        </p:nvSpPr>
+        <p:spPr/>
+        <p:txBody>
+          <a:bodyPr/>
+          <a:lstStyle/>
+          <a:p>
+            <a:r>
+              <a:rPr lang="en-US" dirty="0" smtClean="0"/>
+              <a:t>Evaluation (continued)</a:t>
             </a:r>
             <a:endParaRPr lang="en-US" dirty="0"/>
           </a:p>
@@ -6548,6 +7857,151 @@
           <a:p>
             <a:r>
               <a:rPr lang="en-US" dirty="0" smtClean="0"/>
+              <a:t>Stock Volume </a:t>
+            </a:r>
+            <a:r>
+              <a:rPr lang="en-US" dirty="0" smtClean="0"/>
+              <a:t>prediction (using </a:t>
+            </a:r>
+            <a:r>
+              <a:rPr lang="en-US" dirty="0" err="1" smtClean="0"/>
+              <a:t>kNN</a:t>
+            </a:r>
+            <a:r>
+              <a:rPr lang="en-US" dirty="0" smtClean="0"/>
+              <a:t>)</a:t>
+            </a:r>
+            <a:endParaRPr lang="en-US" dirty="0" smtClean="0"/>
+          </a:p>
+          <a:p>
+            <a:pPr lvl="1"/>
+            <a:r>
+              <a:rPr lang="en-US" dirty="0" smtClean="0"/>
+              <a:t>Prediction is deviates on average 37% from the expected result</a:t>
+            </a:r>
+          </a:p>
+          <a:p>
+            <a:pPr lvl="1"/>
+            <a:r>
+              <a:rPr lang="en-US" dirty="0" smtClean="0"/>
+              <a:t>Standard Deviation : 0.49</a:t>
+            </a:r>
+          </a:p>
+          <a:p>
+            <a:pPr lvl="1"/>
+            <a:r>
+              <a:rPr lang="en-US" dirty="0" smtClean="0"/>
+              <a:t>Top quarter percentile is 10%</a:t>
+            </a:r>
+          </a:p>
+          <a:p>
+            <a:pPr lvl="1"/>
+            <a:r>
+              <a:rPr lang="en-US" dirty="0" smtClean="0"/>
+              <a:t>Top half percentile is 25%</a:t>
+            </a:r>
+          </a:p>
+          <a:p>
+            <a:r>
+              <a:rPr lang="en-US" dirty="0" smtClean="0"/>
+              <a:t>Half the time, the stock volume prediction deviates 25% from the expected result (10% a quarter of the time)</a:t>
+            </a:r>
+            <a:endParaRPr lang="en-US" dirty="0"/>
+          </a:p>
+        </p:txBody>
+      </p:sp>
+      <p:graphicFrame>
+        <p:nvGraphicFramePr>
+          <p:cNvPr id="8" name="Chart 7"/>
+          <p:cNvGraphicFramePr/>
+          <p:nvPr>
+            <p:extLst>
+              <p:ext uri="{D42A27DB-BD31-4B8C-83A1-F6EECF244321}">
+                <p14:modId xmlns:p14="http://schemas.microsoft.com/office/powerpoint/2010/main" val="1827815363"/>
+              </p:ext>
+            </p:extLst>
+          </p:nvPr>
+        </p:nvGraphicFramePr>
+        <p:xfrm>
+          <a:off x="1066800" y="4343400"/>
+          <a:ext cx="6096000" cy="2184400"/>
+        </p:xfrm>
+        <a:graphic>
+          <a:graphicData uri="http://schemas.openxmlformats.org/drawingml/2006/chart">
+            <c:chart xmlns:c="http://schemas.openxmlformats.org/drawingml/2006/chart" xmlns:r="http://schemas.openxmlformats.org/officeDocument/2006/relationships" r:id="rId2"/>
+          </a:graphicData>
+        </a:graphic>
+      </p:graphicFrame>
+    </p:spTree>
+    <p:extLst>
+      <p:ext uri="{BB962C8B-B14F-4D97-AF65-F5344CB8AC3E}">
+        <p14:creationId xmlns:p14="http://schemas.microsoft.com/office/powerpoint/2010/main" val="3430470179"/>
+      </p:ext>
+    </p:extLst>
+  </p:cSld>
+  <p:clrMapOvr>
+    <a:masterClrMapping/>
+  </p:clrMapOvr>
+</p:sld>
+</file>
+
+<file path=ppt/slides/slide12.xml><?xml version="1.0" encoding="utf-8"?>
+<p:sld xmlns:a="http://schemas.openxmlformats.org/drawingml/2006/main" xmlns:r="http://schemas.openxmlformats.org/officeDocument/2006/relationships" xmlns:p="http://schemas.openxmlformats.org/presentationml/2006/main">
+  <p:cSld>
+    <p:spTree>
+      <p:nvGrpSpPr>
+        <p:cNvPr id="1" name=""/>
+        <p:cNvGrpSpPr/>
+        <p:nvPr/>
+      </p:nvGrpSpPr>
+      <p:grpSpPr>
+        <a:xfrm>
+          <a:off x="0" y="0"/>
+          <a:ext cx="0" cy="0"/>
+          <a:chOff x="0" y="0"/>
+          <a:chExt cx="0" cy="0"/>
+        </a:xfrm>
+      </p:grpSpPr>
+      <p:sp>
+        <p:nvSpPr>
+          <p:cNvPr id="2" name="Title 1"/>
+          <p:cNvSpPr>
+            <a:spLocks noGrp="1"/>
+          </p:cNvSpPr>
+          <p:nvPr>
+            <p:ph type="title"/>
+          </p:nvPr>
+        </p:nvSpPr>
+        <p:spPr/>
+        <p:txBody>
+          <a:bodyPr/>
+          <a:lstStyle/>
+          <a:p>
+            <a:r>
+              <a:rPr lang="en-US" dirty="0" smtClean="0"/>
+              <a:t>Statistics</a:t>
+            </a:r>
+            <a:endParaRPr lang="en-US" dirty="0"/>
+          </a:p>
+        </p:txBody>
+      </p:sp>
+      <p:sp>
+        <p:nvSpPr>
+          <p:cNvPr id="3" name="Content Placeholder 2"/>
+          <p:cNvSpPr>
+            <a:spLocks noGrp="1"/>
+          </p:cNvSpPr>
+          <p:nvPr>
+            <p:ph idx="1"/>
+          </p:nvPr>
+        </p:nvSpPr>
+        <p:spPr/>
+        <p:txBody>
+          <a:bodyPr/>
+          <a:lstStyle/>
+          <a:p>
+            <a:r>
+              <a:rPr lang="en-US" dirty="0" smtClean="0"/>
               <a:t>Experiment was run 20 times with randomly selected training and testing data</a:t>
             </a:r>
           </a:p>
@@ -6582,8 +8036,34 @@
             <a:pPr lvl="1"/>
             <a:r>
               <a:rPr lang="en-US" dirty="0" smtClean="0"/>
+              <a:t>1.7 Standard Deviations within ‘Random Guess</a:t>
+            </a:r>
+            <a:r>
+              <a:rPr lang="en-US" dirty="0" smtClean="0"/>
+              <a:t>’</a:t>
+            </a:r>
+          </a:p>
+          <a:p>
+            <a:r>
+              <a:rPr lang="en-US" dirty="0"/>
+              <a:t>Evaluation with Filtered Influence (Twitter Only</a:t>
+            </a:r>
+            <a:r>
+              <a:rPr lang="en-US" dirty="0" smtClean="0"/>
+              <a:t>) Standard Deviation: 0.03836</a:t>
+            </a:r>
+          </a:p>
+          <a:p>
+            <a:pPr lvl="1"/>
+            <a:r>
+              <a:rPr lang="en-US" dirty="0" smtClean="0"/>
               <a:t>1.7 Standard Deviations within ‘Random Guess’</a:t>
             </a:r>
+            <a:endParaRPr lang="en-US" dirty="0"/>
+          </a:p>
+          <a:p>
+            <a:pPr lvl="1"/>
+            <a:endParaRPr lang="en-US" dirty="0" smtClean="0"/>
           </a:p>
           <a:p>
             <a:pPr marL="0" indent="0">
@@ -6606,7 +8086,7 @@
 </p:sld>
 </file>
 
-<file path=ppt/slides/slide11.xml><?xml version="1.0" encoding="utf-8"?>
+<file path=ppt/slides/slide13.xml><?xml version="1.0" encoding="utf-8"?>
 <p:sld xmlns:a="http://schemas.openxmlformats.org/drawingml/2006/main" xmlns:r="http://schemas.openxmlformats.org/officeDocument/2006/relationships" xmlns:p="http://schemas.openxmlformats.org/presentationml/2006/main">
   <p:cSld>
     <p:spTree>
@@ -7357,7 +8837,7 @@
 </p:sld>
 </file>
 
-<file path=ppt/slides/slide12.xml><?xml version="1.0" encoding="utf-8"?>
+<file path=ppt/slides/slide14.xml><?xml version="1.0" encoding="utf-8"?>
 <p:sld xmlns:a="http://schemas.openxmlformats.org/drawingml/2006/main" xmlns:r="http://schemas.openxmlformats.org/officeDocument/2006/relationships" xmlns:p="http://schemas.openxmlformats.org/presentationml/2006/main">
   <p:cSld>
     <p:spTree>
@@ -7391,6 +8871,781 @@
           <a:p>
             <a:r>
               <a:rPr lang="en-US" dirty="0" smtClean="0"/>
+              <a:t>Calculated </a:t>
+            </a:r>
+            <a:r>
+              <a:rPr lang="en-US" dirty="0" smtClean="0"/>
+              <a:t>CCR (Twitter Filtered)</a:t>
+            </a:r>
+            <a:endParaRPr lang="en-US" dirty="0"/>
+          </a:p>
+        </p:txBody>
+      </p:sp>
+      <p:sp>
+        <p:nvSpPr>
+          <p:cNvPr id="3" name="Content Placeholder 2"/>
+          <p:cNvSpPr>
+            <a:spLocks noGrp="1"/>
+          </p:cNvSpPr>
+          <p:nvPr>
+            <p:ph idx="1"/>
+          </p:nvPr>
+        </p:nvSpPr>
+        <p:spPr>
+          <a:xfrm>
+            <a:off x="762000" y="4572000"/>
+            <a:ext cx="6446520" cy="1684338"/>
+          </a:xfrm>
+        </p:spPr>
+        <p:txBody>
+          <a:bodyPr/>
+          <a:lstStyle/>
+          <a:p>
+            <a:r>
+              <a:rPr lang="en-US" dirty="0" smtClean="0"/>
+              <a:t>Pearson cross-correlation coefficient is calculated</a:t>
+            </a:r>
+          </a:p>
+          <a:p>
+            <a:r>
+              <a:rPr lang="en-US" dirty="0" smtClean="0"/>
+              <a:t> </a:t>
+            </a:r>
+          </a:p>
+          <a:p>
+            <a:r>
+              <a:rPr lang="en-US" dirty="0" smtClean="0"/>
+              <a:t>Correlation with volume and influence data is relatively low</a:t>
+            </a:r>
+          </a:p>
+        </p:txBody>
+      </p:sp>
+      <p:graphicFrame>
+        <p:nvGraphicFramePr>
+          <p:cNvPr id="6" name="Table 5"/>
+          <p:cNvGraphicFramePr>
+            <a:graphicFrameLocks noGrp="1"/>
+          </p:cNvGraphicFramePr>
+          <p:nvPr>
+            <p:extLst>
+              <p:ext uri="{D42A27DB-BD31-4B8C-83A1-F6EECF244321}">
+                <p14:modId xmlns:p14="http://schemas.microsoft.com/office/powerpoint/2010/main" val="744278139"/>
+              </p:ext>
+            </p:extLst>
+          </p:nvPr>
+        </p:nvGraphicFramePr>
+        <p:xfrm>
+          <a:off x="457200" y="1905000"/>
+          <a:ext cx="7391399" cy="2381250"/>
+        </p:xfrm>
+        <a:graphic>
+          <a:graphicData uri="http://schemas.openxmlformats.org/drawingml/2006/table">
+            <a:tbl>
+              <a:tblPr firstRow="1" bandRow="1">
+                <a:tableStyleId>{5C22544A-7EE6-4342-B048-85BDC9FD1C3A}</a:tableStyleId>
+              </a:tblPr>
+              <a:tblGrid>
+                <a:gridCol w="1524000"/>
+                <a:gridCol w="677932"/>
+                <a:gridCol w="718542"/>
+                <a:gridCol w="775225"/>
+                <a:gridCol w="923925"/>
+                <a:gridCol w="923925"/>
+                <a:gridCol w="923925"/>
+                <a:gridCol w="923925"/>
+              </a:tblGrid>
+              <a:tr h="476250">
+                <a:tc>
+                  <a:txBody>
+                    <a:bodyPr/>
+                    <a:lstStyle/>
+                    <a:p>
+                      <a:pPr algn="ctr"/>
+                      <a:r>
+                        <a:rPr lang="en-US" dirty="0" smtClean="0"/>
+                        <a:t>Feature</a:t>
+                      </a:r>
+                      <a:endParaRPr lang="en-US" dirty="0"/>
+                    </a:p>
+                  </a:txBody>
+                  <a:tcPr/>
+                </a:tc>
+                <a:tc gridSpan="7">
+                  <a:txBody>
+                    <a:bodyPr/>
+                    <a:lstStyle/>
+                    <a:p>
+                      <a:pPr algn="ctr"/>
+                      <a:r>
+                        <a:rPr lang="en-US" dirty="0" smtClean="0"/>
+                        <a:t>Lag [days]</a:t>
+                      </a:r>
+                      <a:endParaRPr lang="en-US" dirty="0"/>
+                    </a:p>
+                  </a:txBody>
+                  <a:tcPr/>
+                </a:tc>
+                <a:tc hMerge="1">
+                  <a:txBody>
+                    <a:bodyPr/>
+                    <a:lstStyle/>
+                    <a:p>
+                      <a:endParaRPr lang="en-US" dirty="0"/>
+                    </a:p>
+                  </a:txBody>
+                  <a:tcPr/>
+                </a:tc>
+                <a:tc hMerge="1">
+                  <a:txBody>
+                    <a:bodyPr/>
+                    <a:lstStyle/>
+                    <a:p>
+                      <a:endParaRPr lang="en-US" dirty="0"/>
+                    </a:p>
+                  </a:txBody>
+                  <a:tcPr/>
+                </a:tc>
+                <a:tc hMerge="1">
+                  <a:txBody>
+                    <a:bodyPr/>
+                    <a:lstStyle/>
+                    <a:p>
+                      <a:endParaRPr lang="en-US" dirty="0"/>
+                    </a:p>
+                  </a:txBody>
+                  <a:tcPr/>
+                </a:tc>
+                <a:tc hMerge="1">
+                  <a:txBody>
+                    <a:bodyPr/>
+                    <a:lstStyle/>
+                    <a:p>
+                      <a:endParaRPr lang="en-US" dirty="0"/>
+                    </a:p>
+                  </a:txBody>
+                  <a:tcPr/>
+                </a:tc>
+                <a:tc hMerge="1">
+                  <a:txBody>
+                    <a:bodyPr/>
+                    <a:lstStyle/>
+                    <a:p>
+                      <a:endParaRPr lang="en-US" dirty="0"/>
+                    </a:p>
+                  </a:txBody>
+                  <a:tcPr/>
+                </a:tc>
+                <a:tc hMerge="1">
+                  <a:txBody>
+                    <a:bodyPr/>
+                    <a:lstStyle/>
+                    <a:p>
+                      <a:endParaRPr lang="en-US" dirty="0"/>
+                    </a:p>
+                  </a:txBody>
+                  <a:tcPr/>
+                </a:tc>
+              </a:tr>
+              <a:tr h="476250">
+                <a:tc>
+                  <a:txBody>
+                    <a:bodyPr/>
+                    <a:lstStyle/>
+                    <a:p>
+                      <a:pPr algn="ctr"/>
+                      <a:endParaRPr lang="en-US" dirty="0"/>
+                    </a:p>
+                  </a:txBody>
+                  <a:tcPr/>
+                </a:tc>
+                <a:tc>
+                  <a:txBody>
+                    <a:bodyPr/>
+                    <a:lstStyle/>
+                    <a:p>
+                      <a:pPr algn="ctr"/>
+                      <a:r>
+                        <a:rPr lang="en-US" dirty="0" smtClean="0"/>
+                        <a:t>-3</a:t>
+                      </a:r>
+                      <a:endParaRPr lang="en-US" dirty="0"/>
+                    </a:p>
+                  </a:txBody>
+                  <a:tcPr/>
+                </a:tc>
+                <a:tc>
+                  <a:txBody>
+                    <a:bodyPr/>
+                    <a:lstStyle/>
+                    <a:p>
+                      <a:pPr algn="ctr"/>
+                      <a:r>
+                        <a:rPr lang="en-US" dirty="0" smtClean="0"/>
+                        <a:t>-2</a:t>
+                      </a:r>
+                      <a:endParaRPr lang="en-US" dirty="0"/>
+                    </a:p>
+                  </a:txBody>
+                  <a:tcPr/>
+                </a:tc>
+                <a:tc>
+                  <a:txBody>
+                    <a:bodyPr/>
+                    <a:lstStyle/>
+                    <a:p>
+                      <a:pPr algn="ctr"/>
+                      <a:r>
+                        <a:rPr lang="en-US" dirty="0" smtClean="0"/>
+                        <a:t>-1</a:t>
+                      </a:r>
+                      <a:endParaRPr lang="en-US" dirty="0"/>
+                    </a:p>
+                  </a:txBody>
+                  <a:tcPr/>
+                </a:tc>
+                <a:tc>
+                  <a:txBody>
+                    <a:bodyPr/>
+                    <a:lstStyle/>
+                    <a:p>
+                      <a:pPr algn="ctr"/>
+                      <a:r>
+                        <a:rPr lang="en-US" dirty="0" smtClean="0"/>
+                        <a:t>0</a:t>
+                      </a:r>
+                      <a:endParaRPr lang="en-US" dirty="0"/>
+                    </a:p>
+                  </a:txBody>
+                  <a:tcPr/>
+                </a:tc>
+                <a:tc>
+                  <a:txBody>
+                    <a:bodyPr/>
+                    <a:lstStyle/>
+                    <a:p>
+                      <a:pPr algn="ctr"/>
+                      <a:r>
+                        <a:rPr lang="en-US" dirty="0" smtClean="0"/>
+                        <a:t>1</a:t>
+                      </a:r>
+                      <a:endParaRPr lang="en-US" dirty="0"/>
+                    </a:p>
+                  </a:txBody>
+                  <a:tcPr/>
+                </a:tc>
+                <a:tc>
+                  <a:txBody>
+                    <a:bodyPr/>
+                    <a:lstStyle/>
+                    <a:p>
+                      <a:pPr algn="ctr"/>
+                      <a:r>
+                        <a:rPr lang="en-US" dirty="0" smtClean="0"/>
+                        <a:t>2</a:t>
+                      </a:r>
+                      <a:endParaRPr lang="en-US" dirty="0"/>
+                    </a:p>
+                  </a:txBody>
+                  <a:tcPr/>
+                </a:tc>
+                <a:tc>
+                  <a:txBody>
+                    <a:bodyPr/>
+                    <a:lstStyle/>
+                    <a:p>
+                      <a:pPr algn="ctr"/>
+                      <a:r>
+                        <a:rPr lang="en-US" dirty="0" smtClean="0"/>
+                        <a:t>3</a:t>
+                      </a:r>
+                      <a:endParaRPr lang="en-US" dirty="0"/>
+                    </a:p>
+                  </a:txBody>
+                  <a:tcPr/>
+                </a:tc>
+              </a:tr>
+              <a:tr h="476250">
+                <a:tc>
+                  <a:txBody>
+                    <a:bodyPr/>
+                    <a:lstStyle/>
+                    <a:p>
+                      <a:pPr algn="ctr"/>
+                      <a:r>
+                        <a:rPr lang="en-US" dirty="0" smtClean="0"/>
+                        <a:t>Inf. Score</a:t>
+                      </a:r>
+                      <a:endParaRPr lang="en-US" dirty="0"/>
+                    </a:p>
+                  </a:txBody>
+                  <a:tcPr/>
+                </a:tc>
+                <a:tc>
+                  <a:txBody>
+                    <a:bodyPr/>
+                    <a:lstStyle/>
+                    <a:p>
+                      <a:pPr algn="ctr"/>
+                      <a:r>
+                        <a:rPr lang="en-US" sz="1400" dirty="0" smtClean="0"/>
+                        <a:t>0.009</a:t>
+                      </a:r>
+                      <a:endParaRPr lang="en-US" sz="1400" dirty="0"/>
+                    </a:p>
+                  </a:txBody>
+                  <a:tcPr/>
+                </a:tc>
+                <a:tc>
+                  <a:txBody>
+                    <a:bodyPr/>
+                    <a:lstStyle/>
+                    <a:p>
+                      <a:pPr algn="ctr"/>
+                      <a:r>
+                        <a:rPr lang="en-US" sz="1400" dirty="0" smtClean="0"/>
+                        <a:t>-0.022</a:t>
+                      </a:r>
+                      <a:endParaRPr lang="en-US" sz="1400" dirty="0"/>
+                    </a:p>
+                  </a:txBody>
+                  <a:tcPr/>
+                </a:tc>
+                <a:tc>
+                  <a:txBody>
+                    <a:bodyPr/>
+                    <a:lstStyle/>
+                    <a:p>
+                      <a:pPr algn="ctr"/>
+                      <a:r>
+                        <a:rPr lang="en-US" sz="1400" dirty="0" smtClean="0"/>
+                        <a:t>-0.005</a:t>
+                      </a:r>
+                      <a:endParaRPr lang="en-US" sz="1400" dirty="0"/>
+                    </a:p>
+                  </a:txBody>
+                  <a:tcPr/>
+                </a:tc>
+                <a:tc>
+                  <a:txBody>
+                    <a:bodyPr/>
+                    <a:lstStyle/>
+                    <a:p>
+                      <a:pPr algn="ctr"/>
+                      <a:r>
+                        <a:rPr lang="en-US" sz="1400" dirty="0" smtClean="0"/>
+                        <a:t>-</a:t>
+                      </a:r>
+                      <a:r>
+                        <a:rPr lang="en-US" sz="1400" dirty="0" smtClean="0"/>
+                        <a:t>0.011</a:t>
+                      </a:r>
+                      <a:endParaRPr lang="en-US" sz="1400" dirty="0"/>
+                    </a:p>
+                  </a:txBody>
+                  <a:tcPr/>
+                </a:tc>
+                <a:tc>
+                  <a:txBody>
+                    <a:bodyPr/>
+                    <a:lstStyle/>
+                    <a:p>
+                      <a:pPr algn="ctr"/>
+                      <a:r>
+                        <a:rPr lang="en-US" sz="1400" dirty="0" smtClean="0"/>
+                        <a:t>0.004</a:t>
+                      </a:r>
+                      <a:endParaRPr lang="en-US" sz="1400" dirty="0"/>
+                    </a:p>
+                  </a:txBody>
+                  <a:tcPr/>
+                </a:tc>
+                <a:tc>
+                  <a:txBody>
+                    <a:bodyPr/>
+                    <a:lstStyle/>
+                    <a:p>
+                      <a:pPr algn="ctr"/>
+                      <a:r>
+                        <a:rPr lang="en-US" sz="1400" dirty="0" smtClean="0"/>
+                        <a:t>-</a:t>
+                      </a:r>
+                      <a:r>
+                        <a:rPr lang="en-US" sz="1400" dirty="0" smtClean="0"/>
+                        <a:t>0.006</a:t>
+                      </a:r>
+                      <a:endParaRPr lang="en-US" sz="1400" dirty="0"/>
+                    </a:p>
+                  </a:txBody>
+                  <a:tcPr/>
+                </a:tc>
+                <a:tc>
+                  <a:txBody>
+                    <a:bodyPr/>
+                    <a:lstStyle/>
+                    <a:p>
+                      <a:pPr algn="ctr"/>
+                      <a:r>
+                        <a:rPr lang="en-US" sz="1400" dirty="0" smtClean="0"/>
+                        <a:t>0.028</a:t>
+                      </a:r>
+                      <a:endParaRPr lang="en-US" sz="1400" dirty="0"/>
+                    </a:p>
+                  </a:txBody>
+                  <a:tcPr/>
+                </a:tc>
+              </a:tr>
+              <a:tr h="476250">
+                <a:tc>
+                  <a:txBody>
+                    <a:bodyPr/>
+                    <a:lstStyle/>
+                    <a:p>
+                      <a:pPr algn="ctr"/>
+                      <a:r>
+                        <a:rPr lang="en-US" dirty="0" smtClean="0"/>
+                        <a:t>Inf.</a:t>
+                      </a:r>
+                      <a:r>
+                        <a:rPr lang="en-US" baseline="0" dirty="0" smtClean="0"/>
+                        <a:t> Volume</a:t>
+                      </a:r>
+                      <a:endParaRPr lang="en-US" dirty="0"/>
+                    </a:p>
+                  </a:txBody>
+                  <a:tcPr/>
+                </a:tc>
+                <a:tc>
+                  <a:txBody>
+                    <a:bodyPr/>
+                    <a:lstStyle/>
+                    <a:p>
+                      <a:pPr algn="ctr"/>
+                      <a:r>
+                        <a:rPr lang="en-US" sz="1400" dirty="0" smtClean="0"/>
+                        <a:t>0.002</a:t>
+                      </a:r>
+                      <a:endParaRPr lang="en-US" sz="1400" dirty="0"/>
+                    </a:p>
+                  </a:txBody>
+                  <a:tcPr/>
+                </a:tc>
+                <a:tc>
+                  <a:txBody>
+                    <a:bodyPr/>
+                    <a:lstStyle/>
+                    <a:p>
+                      <a:pPr algn="ctr"/>
+                      <a:r>
+                        <a:rPr lang="en-US" sz="1400" dirty="0" smtClean="0"/>
+                        <a:t>0.013</a:t>
+                      </a:r>
+                      <a:endParaRPr lang="en-US" sz="1400" dirty="0"/>
+                    </a:p>
+                  </a:txBody>
+                  <a:tcPr/>
+                </a:tc>
+                <a:tc>
+                  <a:txBody>
+                    <a:bodyPr/>
+                    <a:lstStyle/>
+                    <a:p>
+                      <a:pPr algn="ctr"/>
+                      <a:r>
+                        <a:rPr lang="en-US" sz="1400" dirty="0" smtClean="0"/>
+                        <a:t>-0.013</a:t>
+                      </a:r>
+                      <a:endParaRPr lang="en-US" sz="1400" dirty="0"/>
+                    </a:p>
+                  </a:txBody>
+                  <a:tcPr/>
+                </a:tc>
+                <a:tc>
+                  <a:txBody>
+                    <a:bodyPr/>
+                    <a:lstStyle/>
+                    <a:p>
+                      <a:pPr algn="ctr"/>
+                      <a:r>
+                        <a:rPr lang="en-US" sz="1400" dirty="0" smtClean="0"/>
+                        <a:t>-</a:t>
+                      </a:r>
+                      <a:r>
+                        <a:rPr lang="en-US" sz="1400" dirty="0" smtClean="0"/>
+                        <a:t>0.014</a:t>
+                      </a:r>
+                      <a:endParaRPr lang="en-US" sz="1400" dirty="0"/>
+                    </a:p>
+                  </a:txBody>
+                  <a:tcPr/>
+                </a:tc>
+                <a:tc>
+                  <a:txBody>
+                    <a:bodyPr/>
+                    <a:lstStyle/>
+                    <a:p>
+                      <a:pPr algn="ctr"/>
+                      <a:r>
+                        <a:rPr lang="en-US" sz="1400" dirty="0" smtClean="0"/>
+                        <a:t>-0.013</a:t>
+                      </a:r>
+                      <a:endParaRPr lang="en-US" sz="1400" dirty="0"/>
+                    </a:p>
+                  </a:txBody>
+                  <a:tcPr/>
+                </a:tc>
+                <a:tc>
+                  <a:txBody>
+                    <a:bodyPr/>
+                    <a:lstStyle/>
+                    <a:p>
+                      <a:pPr algn="ctr"/>
+                      <a:r>
+                        <a:rPr lang="en-US" sz="1400" dirty="0" smtClean="0"/>
+                        <a:t>-0.0128</a:t>
+                      </a:r>
+                      <a:endParaRPr lang="en-US" sz="1400" dirty="0"/>
+                    </a:p>
+                  </a:txBody>
+                  <a:tcPr/>
+                </a:tc>
+                <a:tc>
+                  <a:txBody>
+                    <a:bodyPr/>
+                    <a:lstStyle/>
+                    <a:p>
+                      <a:pPr algn="ctr"/>
+                      <a:r>
+                        <a:rPr lang="en-US" sz="1400" dirty="0" smtClean="0"/>
+                        <a:t>0.007</a:t>
+                      </a:r>
+                      <a:endParaRPr lang="en-US" sz="1400" dirty="0"/>
+                    </a:p>
+                  </a:txBody>
+                  <a:tcPr/>
+                </a:tc>
+              </a:tr>
+              <a:tr h="476250">
+                <a:tc>
+                  <a:txBody>
+                    <a:bodyPr/>
+                    <a:lstStyle/>
+                    <a:p>
+                      <a:pPr algn="ctr"/>
+                      <a:r>
+                        <a:rPr lang="en-US" dirty="0" smtClean="0"/>
+                        <a:t>Sentiment</a:t>
+                      </a:r>
+                      <a:endParaRPr lang="en-US" dirty="0"/>
+                    </a:p>
+                  </a:txBody>
+                  <a:tcPr/>
+                </a:tc>
+                <a:tc>
+                  <a:txBody>
+                    <a:bodyPr/>
+                    <a:lstStyle/>
+                    <a:p>
+                      <a:pPr algn="ctr"/>
+                      <a:r>
+                        <a:rPr lang="en-US" sz="1400" dirty="0" smtClean="0"/>
+                        <a:t>-0.02</a:t>
+                      </a:r>
+                      <a:endParaRPr lang="en-US" sz="1400" dirty="0"/>
+                    </a:p>
+                  </a:txBody>
+                  <a:tcPr/>
+                </a:tc>
+                <a:tc>
+                  <a:txBody>
+                    <a:bodyPr/>
+                    <a:lstStyle/>
+                    <a:p>
+                      <a:pPr algn="ctr"/>
+                      <a:r>
+                        <a:rPr lang="en-US" sz="1400" dirty="0" smtClean="0"/>
+                        <a:t>-0.005</a:t>
+                      </a:r>
+                      <a:endParaRPr lang="en-US" sz="1400" dirty="0"/>
+                    </a:p>
+                  </a:txBody>
+                  <a:tcPr/>
+                </a:tc>
+                <a:tc>
+                  <a:txBody>
+                    <a:bodyPr/>
+                    <a:lstStyle/>
+                    <a:p>
+                      <a:pPr algn="ctr"/>
+                      <a:r>
+                        <a:rPr lang="en-US" sz="1400" dirty="0" smtClean="0"/>
+                        <a:t>-0.04</a:t>
+                      </a:r>
+                      <a:endParaRPr lang="en-US" sz="1400" dirty="0"/>
+                    </a:p>
+                  </a:txBody>
+                  <a:tcPr/>
+                </a:tc>
+                <a:tc>
+                  <a:txBody>
+                    <a:bodyPr/>
+                    <a:lstStyle/>
+                    <a:p>
+                      <a:pPr algn="ctr"/>
+                      <a:r>
+                        <a:rPr lang="en-US" sz="1400" dirty="0" smtClean="0"/>
+                        <a:t>-</a:t>
+                      </a:r>
+                      <a:r>
+                        <a:rPr lang="en-US" sz="1400" dirty="0" smtClean="0"/>
+                        <a:t>0.031</a:t>
+                      </a:r>
+                      <a:endParaRPr lang="en-US" sz="1400" dirty="0"/>
+                    </a:p>
+                  </a:txBody>
+                  <a:tcPr/>
+                </a:tc>
+                <a:tc>
+                  <a:txBody>
+                    <a:bodyPr/>
+                    <a:lstStyle/>
+                    <a:p>
+                      <a:pPr algn="ctr"/>
+                      <a:r>
+                        <a:rPr lang="en-US" sz="1400" dirty="0" smtClean="0"/>
+                        <a:t>-</a:t>
+                      </a:r>
+                      <a:r>
+                        <a:rPr lang="en-US" sz="1400" dirty="0" smtClean="0"/>
+                        <a:t>0.026</a:t>
+                      </a:r>
+                      <a:endParaRPr lang="en-US" sz="1400" dirty="0"/>
+                    </a:p>
+                  </a:txBody>
+                  <a:tcPr/>
+                </a:tc>
+                <a:tc>
+                  <a:txBody>
+                    <a:bodyPr/>
+                    <a:lstStyle/>
+                    <a:p>
+                      <a:pPr algn="ctr"/>
+                      <a:r>
+                        <a:rPr lang="en-US" sz="1400" dirty="0" smtClean="0"/>
+                        <a:t>0.0165</a:t>
+                      </a:r>
+                      <a:endParaRPr lang="en-US" sz="1400" dirty="0"/>
+                    </a:p>
+                  </a:txBody>
+                  <a:tcPr/>
+                </a:tc>
+                <a:tc>
+                  <a:txBody>
+                    <a:bodyPr/>
+                    <a:lstStyle/>
+                    <a:p>
+                      <a:pPr algn="ctr"/>
+                      <a:r>
+                        <a:rPr lang="en-US" sz="1400" dirty="0" smtClean="0"/>
+                        <a:t>0.031</a:t>
+                      </a:r>
+                      <a:endParaRPr lang="en-US" sz="1400" dirty="0"/>
+                    </a:p>
+                  </a:txBody>
+                  <a:tcPr/>
+                </a:tc>
+              </a:tr>
+            </a:tbl>
+          </a:graphicData>
+        </a:graphic>
+      </p:graphicFrame>
+      <p:pic>
+        <p:nvPicPr>
+          <p:cNvPr id="1026" name="Picture 2" descr="\rho_{X,Y}=\mathrm{corr}(X,Y)={\mathrm{cov}(X,Y) \over \sigma_X \sigma_Y} ={E[(X-\mu_X)(Y-\mu_Y)] \over \sigma_X\sigma_Y},"/>
+          <p:cNvPicPr>
+            <a:picLocks noChangeAspect="1" noChangeArrowheads="1"/>
+          </p:cNvPicPr>
+          <p:nvPr/>
+        </p:nvPicPr>
+        <p:blipFill>
+          <a:blip r:embed="rId2">
+            <a:extLst>
+              <a:ext uri="{28A0092B-C50C-407E-A947-70E740481C1C}">
+                <a14:useLocalDpi xmlns:a14="http://schemas.microsoft.com/office/drawing/2010/main" val="0"/>
+              </a:ext>
+            </a:extLst>
+          </a:blip>
+          <a:srcRect/>
+          <a:stretch>
+            <a:fillRect/>
+          </a:stretch>
+        </p:blipFill>
+        <p:spPr bwMode="auto">
+          <a:xfrm>
+            <a:off x="1037971" y="4999109"/>
+            <a:ext cx="4676775" cy="438151"/>
+          </a:xfrm>
+          <a:prstGeom prst="rect">
+            <a:avLst/>
+          </a:prstGeom>
+          <a:noFill/>
+          <a:extLst>
+            <a:ext uri="{909E8E84-426E-40DD-AFC4-6F175D3DCCD1}">
+              <a14:hiddenFill xmlns:a14="http://schemas.microsoft.com/office/drawing/2010/main">
+                <a:solidFill>
+                  <a:srgbClr val="FFFFFF"/>
+                </a:solidFill>
+              </a14:hiddenFill>
+            </a:ext>
+          </a:extLst>
+        </p:spPr>
+      </p:pic>
+    </p:spTree>
+    <p:extLst>
+      <p:ext uri="{BB962C8B-B14F-4D97-AF65-F5344CB8AC3E}">
+        <p14:creationId xmlns:p14="http://schemas.microsoft.com/office/powerpoint/2010/main" val="3361417009"/>
+      </p:ext>
+    </p:extLst>
+  </p:cSld>
+  <p:clrMapOvr>
+    <a:masterClrMapping/>
+  </p:clrMapOvr>
+</p:sld>
+</file>
+
+<file path=ppt/slides/slide15.xml><?xml version="1.0" encoding="utf-8"?>
+<p:sld xmlns:a="http://schemas.openxmlformats.org/drawingml/2006/main" xmlns:r="http://schemas.openxmlformats.org/officeDocument/2006/relationships" xmlns:p="http://schemas.openxmlformats.org/presentationml/2006/main">
+  <p:cSld>
+    <p:spTree>
+      <p:nvGrpSpPr>
+        <p:cNvPr id="1" name=""/>
+        <p:cNvGrpSpPr/>
+        <p:nvPr/>
+      </p:nvGrpSpPr>
+      <p:grpSpPr>
+        <a:xfrm>
+          <a:off x="0" y="0"/>
+          <a:ext cx="0" cy="0"/>
+          <a:chOff x="0" y="0"/>
+          <a:chExt cx="0" cy="0"/>
+        </a:xfrm>
+      </p:grpSpPr>
+      <p:sp>
+        <p:nvSpPr>
+          <p:cNvPr id="2" name="Title 1"/>
+          <p:cNvSpPr>
+            <a:spLocks noGrp="1"/>
+          </p:cNvSpPr>
+          <p:nvPr>
+            <p:ph type="title"/>
+          </p:nvPr>
+        </p:nvSpPr>
+        <p:spPr/>
+        <p:txBody>
+          <a:bodyPr/>
+          <a:lstStyle/>
+          <a:p>
+            <a:r>
+              <a:rPr lang="en-US" dirty="0" smtClean="0"/>
               <a:t>Future Work</a:t>
             </a:r>
             <a:endParaRPr lang="en-US" dirty="0"/>
@@ -7449,6 +9704,116 @@
     <p:extLst>
       <p:ext uri="{BB962C8B-B14F-4D97-AF65-F5344CB8AC3E}">
         <p14:creationId xmlns:p14="http://schemas.microsoft.com/office/powerpoint/2010/main" val="2755801020"/>
+      </p:ext>
+    </p:extLst>
+  </p:cSld>
+  <p:clrMapOvr>
+    <a:masterClrMapping/>
+  </p:clrMapOvr>
+</p:sld>
+</file>
+
+<file path=ppt/slides/slide16.xml><?xml version="1.0" encoding="utf-8"?>
+<p:sld xmlns:a="http://schemas.openxmlformats.org/drawingml/2006/main" xmlns:r="http://schemas.openxmlformats.org/officeDocument/2006/relationships" xmlns:p="http://schemas.openxmlformats.org/presentationml/2006/main">
+  <p:cSld>
+    <p:spTree>
+      <p:nvGrpSpPr>
+        <p:cNvPr id="1" name=""/>
+        <p:cNvGrpSpPr/>
+        <p:nvPr/>
+      </p:nvGrpSpPr>
+      <p:grpSpPr>
+        <a:xfrm>
+          <a:off x="0" y="0"/>
+          <a:ext cx="0" cy="0"/>
+          <a:chOff x="0" y="0"/>
+          <a:chExt cx="0" cy="0"/>
+        </a:xfrm>
+      </p:grpSpPr>
+      <p:sp>
+        <p:nvSpPr>
+          <p:cNvPr id="2" name="Title 1"/>
+          <p:cNvSpPr>
+            <a:spLocks noGrp="1"/>
+          </p:cNvSpPr>
+          <p:nvPr>
+            <p:ph type="title"/>
+          </p:nvPr>
+        </p:nvSpPr>
+        <p:spPr/>
+        <p:txBody>
+          <a:bodyPr/>
+          <a:lstStyle/>
+          <a:p>
+            <a:r>
+              <a:rPr lang="en-US" dirty="0" smtClean="0"/>
+              <a:t>Related Work</a:t>
+            </a:r>
+            <a:endParaRPr lang="en-US" dirty="0"/>
+          </a:p>
+        </p:txBody>
+      </p:sp>
+      <p:sp>
+        <p:nvSpPr>
+          <p:cNvPr id="3" name="Content Placeholder 2"/>
+          <p:cNvSpPr>
+            <a:spLocks noGrp="1"/>
+          </p:cNvSpPr>
+          <p:nvPr>
+            <p:ph idx="1"/>
+          </p:nvPr>
+        </p:nvSpPr>
+        <p:spPr/>
+        <p:txBody>
+          <a:bodyPr/>
+          <a:lstStyle/>
+          <a:p>
+            <a:r>
+              <a:rPr lang="en-US" dirty="0"/>
+              <a:t>This project uses Prof. Joachim's SVM-light program.</a:t>
+            </a:r>
+            <a:br>
+              <a:rPr lang="en-US" dirty="0"/>
+            </a:br>
+            <a:r>
+              <a:rPr lang="en-US" dirty="0">
+                <a:hlinkClick r:id="rId2"/>
+              </a:rPr>
+              <a:t>http://svmlight.joachims.org/</a:t>
+            </a:r>
+            <a:endParaRPr lang="en-US" dirty="0"/>
+          </a:p>
+          <a:p>
+            <a:r>
+              <a:rPr lang="en-US" dirty="0"/>
+              <a:t>Ruiz, Castillo et al. also took a </a:t>
+            </a:r>
+            <a:r>
+              <a:rPr lang="en-US" dirty="0" smtClean="0"/>
+              <a:t>similar </a:t>
+            </a:r>
+            <a:r>
+              <a:rPr lang="en-US" dirty="0"/>
+              <a:t>approach; however they only used Twitter data. </a:t>
+            </a:r>
+            <a:r>
+              <a:rPr lang="en-US" dirty="0">
+                <a:hlinkClick r:id="rId3"/>
+              </a:rPr>
+              <a:t>http://www.cs.ucr.edu/~vagelis/publications/wsdm2012-microblog-financial.pdf</a:t>
+            </a:r>
+            <a:r>
+              <a:rPr lang="en-US" dirty="0" smtClean="0"/>
+              <a:t>.</a:t>
+            </a:r>
+            <a:endParaRPr lang="en-US" dirty="0"/>
+          </a:p>
+        </p:txBody>
+      </p:sp>
+    </p:spTree>
+    <p:extLst>
+      <p:ext uri="{BB962C8B-B14F-4D97-AF65-F5344CB8AC3E}">
+        <p14:creationId xmlns:p14="http://schemas.microsoft.com/office/powerpoint/2010/main" val="1757750790"/>
       </p:ext>
     </p:extLst>
   </p:cSld>
@@ -7614,11 +9979,7 @@
             <a:pPr lvl="1"/>
             <a:r>
               <a:rPr lang="en-US" dirty="0" smtClean="0"/>
-              <a:t>We aimed to predict whether the direction of volume of stock trades for the next </a:t>
-            </a:r>
-            <a:r>
-              <a:rPr lang="en-US" dirty="0" smtClean="0"/>
-              <a:t>day</a:t>
+              <a:t>We aimed to predict whether the direction of volume of stock trades for the next day</a:t>
             </a:r>
           </a:p>
           <a:p>
@@ -7627,7 +9988,6 @@
               <a:rPr lang="en-US" dirty="0" smtClean="0"/>
               <a:t>We also aimed to predict stock volumes values for the next day</a:t>
             </a:r>
-            <a:endParaRPr lang="en-US" dirty="0" smtClean="0"/>
           </a:p>
           <a:p>
             <a:r>
@@ -8207,85 +10567,30 @@
           <a:lstStyle/>
           <a:p>
             <a:r>
-              <a:rPr lang="en-US" dirty="0" smtClean="0"/>
+              <a:rPr lang="en-US" dirty="0"/>
               <a:t>Evaluation (continued)</a:t>
             </a:r>
-            <a:endParaRPr lang="en-US" dirty="0"/>
-          </a:p>
-        </p:txBody>
-      </p:sp>
-      <p:sp>
-        <p:nvSpPr>
-          <p:cNvPr id="3" name="Content Placeholder 2"/>
-          <p:cNvSpPr>
-            <a:spLocks noGrp="1"/>
-          </p:cNvSpPr>
-          <p:nvPr>
-            <p:ph idx="1"/>
-          </p:nvPr>
-        </p:nvSpPr>
-        <p:spPr/>
-        <p:txBody>
-          <a:bodyPr/>
-          <a:lstStyle/>
-          <a:p>
-            <a:r>
-              <a:rPr lang="en-US" dirty="0" smtClean="0"/>
-              <a:t>Stock Volume prediction</a:t>
-            </a:r>
-          </a:p>
-          <a:p>
-            <a:pPr lvl="1"/>
-            <a:r>
-              <a:rPr lang="en-US" dirty="0" smtClean="0"/>
-              <a:t>Prediction is deviates on average 37% from the expected result</a:t>
-            </a:r>
-          </a:p>
-          <a:p>
-            <a:pPr lvl="1"/>
-            <a:r>
-              <a:rPr lang="en-US" dirty="0" smtClean="0"/>
-              <a:t>Standard Deviation : 0.49</a:t>
-            </a:r>
-          </a:p>
-          <a:p>
-            <a:pPr lvl="1"/>
-            <a:r>
-              <a:rPr lang="en-US" dirty="0" smtClean="0"/>
-              <a:t>Top quarter percentile is 10%</a:t>
-            </a:r>
-          </a:p>
-          <a:p>
-            <a:pPr lvl="1"/>
-            <a:r>
-              <a:rPr lang="en-US" dirty="0" smtClean="0"/>
-              <a:t>Top half percentile is 25%</a:t>
-            </a:r>
-          </a:p>
-          <a:p>
-            <a:r>
-              <a:rPr lang="en-US" dirty="0" smtClean="0"/>
-              <a:t>Half the time, the stock volume prediction deviates 25% from the expected result (10% a quarter of the time)</a:t>
-            </a:r>
-            <a:endParaRPr lang="en-US" dirty="0"/>
           </a:p>
         </p:txBody>
       </p:sp>
       <p:graphicFrame>
         <p:nvGraphicFramePr>
-          <p:cNvPr id="8" name="Chart 7"/>
-          <p:cNvGraphicFramePr/>
+          <p:cNvPr id="4" name="Content Placeholder 3"/>
+          <p:cNvGraphicFramePr>
+            <a:graphicFrameLocks noGrp="1"/>
+          </p:cNvGraphicFramePr>
           <p:nvPr>
+            <p:ph idx="1"/>
             <p:extLst>
               <p:ext uri="{D42A27DB-BD31-4B8C-83A1-F6EECF244321}">
-                <p14:modId xmlns:p14="http://schemas.microsoft.com/office/powerpoint/2010/main" val="1827815363"/>
+                <p14:modId xmlns:p14="http://schemas.microsoft.com/office/powerpoint/2010/main" val="3973124561"/>
               </p:ext>
             </p:extLst>
           </p:nvPr>
         </p:nvGraphicFramePr>
         <p:xfrm>
-          <a:off x="1066800" y="4343400"/>
-          <a:ext cx="6096000" cy="2184400"/>
+          <a:off x="946150" y="1828800"/>
+          <a:ext cx="6446838" cy="4351338"/>
         </p:xfrm>
         <a:graphic>
           <a:graphicData uri="http://schemas.openxmlformats.org/drawingml/2006/chart">
@@ -8296,7 +10601,7 @@
     </p:spTree>
     <p:extLst>
       <p:ext uri="{BB962C8B-B14F-4D97-AF65-F5344CB8AC3E}">
-        <p14:creationId xmlns:p14="http://schemas.microsoft.com/office/powerpoint/2010/main" val="3430470179"/>
+        <p14:creationId xmlns:p14="http://schemas.microsoft.com/office/powerpoint/2010/main" val="3607700502"/>
       </p:ext>
     </p:extLst>
   </p:cSld>

</xml_diff>